<commit_message>
Update Pre-Defense presentation slide
</commit_message>
<xml_diff>
--- a/(221-15-4680)Pre-Defense Slide.pptx
+++ b/(221-15-4680)Pre-Defense Slide.pptx
@@ -6556,7 +6556,7 @@
             <p:ph sz="quarter" idx="13"/>
             <p:extLst>
               <p:ext uri="{D42A27DB-BD31-4B8C-83A1-F6EECF244321}">
-                <p14:modId xmlns:p14="http://schemas.microsoft.com/office/powerpoint/2010/main" val="1107032252"/>
+                <p14:modId xmlns:p14="http://schemas.microsoft.com/office/powerpoint/2010/main" val="3661186333"/>
               </p:ext>
             </p:extLst>
           </p:nvPr>
@@ -6955,7 +6955,7 @@
                       <a:r>
                         <a:rPr lang="en-US" sz="2000" b="0" i="0" u="none" strike="noStrike">
                           <a:solidFill>
-                            <a:srgbClr val="000000"/>
+                            <a:schemeClr val="tx2"/>
                           </a:solidFill>
                           <a:effectLst/>
                           <a:latin typeface="Century" panose="02040604050505020304" pitchFamily="18" charset="0"/>
@@ -6963,6 +6963,9 @@
                         <a:t>Naive Bayes</a:t>
                       </a:r>
                       <a:endParaRPr lang="en-US" sz="3600">
+                        <a:solidFill>
+                          <a:schemeClr val="tx2"/>
+                        </a:solidFill>
                         <a:effectLst/>
                       </a:endParaRPr>
                     </a:p>
@@ -7018,7 +7021,7 @@
                       <a:r>
                         <a:rPr lang="en-US" sz="2000" b="0" i="0" u="none" strike="noStrike" dirty="0">
                           <a:solidFill>
-                            <a:srgbClr val="000000"/>
+                            <a:schemeClr val="tx2"/>
                           </a:solidFill>
                           <a:effectLst/>
                           <a:latin typeface="Century" panose="02040604050505020304" pitchFamily="18" charset="0"/>
@@ -7026,6 +7029,9 @@
                         <a:t>100.00%</a:t>
                       </a:r>
                       <a:endParaRPr lang="en-US" sz="3600" dirty="0">
+                        <a:solidFill>
+                          <a:schemeClr val="tx2"/>
+                        </a:solidFill>
                         <a:effectLst/>
                       </a:endParaRPr>
                     </a:p>
@@ -7081,7 +7087,7 @@
                       <a:r>
                         <a:rPr lang="en-US" sz="2000" b="0" i="0" u="none" strike="noStrike">
                           <a:solidFill>
-                            <a:srgbClr val="000000"/>
+                            <a:schemeClr val="tx2"/>
                           </a:solidFill>
                           <a:effectLst/>
                           <a:latin typeface="Century" panose="02040604050505020304" pitchFamily="18" charset="0"/>
@@ -7089,6 +7095,9 @@
                         <a:t>100.00%</a:t>
                       </a:r>
                       <a:endParaRPr lang="en-US" sz="3600">
+                        <a:solidFill>
+                          <a:schemeClr val="tx2"/>
+                        </a:solidFill>
                         <a:effectLst/>
                       </a:endParaRPr>
                     </a:p>
@@ -7144,7 +7153,7 @@
                       <a:r>
                         <a:rPr lang="en-US" sz="2000" b="0" i="0" u="none" strike="noStrike">
                           <a:solidFill>
-                            <a:srgbClr val="000000"/>
+                            <a:schemeClr val="tx2"/>
                           </a:solidFill>
                           <a:effectLst/>
                           <a:latin typeface="Century" panose="02040604050505020304" pitchFamily="18" charset="0"/>
@@ -7152,6 +7161,9 @@
                         <a:t>100.00%</a:t>
                       </a:r>
                       <a:endParaRPr lang="en-US" sz="3600">
+                        <a:solidFill>
+                          <a:schemeClr val="tx2"/>
+                        </a:solidFill>
                         <a:effectLst/>
                       </a:endParaRPr>
                     </a:p>
@@ -7207,7 +7219,7 @@
                       <a:r>
                         <a:rPr lang="en-US" sz="2000" b="0" i="0" u="none" strike="noStrike" dirty="0">
                           <a:solidFill>
-                            <a:srgbClr val="000000"/>
+                            <a:schemeClr val="tx2"/>
                           </a:solidFill>
                           <a:effectLst/>
                           <a:latin typeface="Century" panose="02040604050505020304" pitchFamily="18" charset="0"/>
@@ -7215,6 +7227,9 @@
                         <a:t>100.00%</a:t>
                       </a:r>
                       <a:endParaRPr lang="en-US" sz="3600" dirty="0">
+                        <a:solidFill>
+                          <a:schemeClr val="tx2"/>
+                        </a:solidFill>
                         <a:effectLst/>
                       </a:endParaRPr>
                     </a:p>
@@ -7277,7 +7292,7 @@
                       <a:r>
                         <a:rPr lang="en-US" sz="2000" b="0" i="0" u="none" strike="noStrike">
                           <a:solidFill>
-                            <a:srgbClr val="000000"/>
+                            <a:schemeClr val="tx2"/>
                           </a:solidFill>
                           <a:effectLst/>
                           <a:latin typeface="Century" panose="02040604050505020304" pitchFamily="18" charset="0"/>
@@ -7285,6 +7300,9 @@
                         <a:t>Logistic Regression</a:t>
                       </a:r>
                       <a:endParaRPr lang="en-US" sz="3600">
+                        <a:solidFill>
+                          <a:schemeClr val="tx2"/>
+                        </a:solidFill>
                         <a:effectLst/>
                       </a:endParaRPr>
                     </a:p>
@@ -7340,7 +7358,7 @@
                       <a:r>
                         <a:rPr lang="en-US" sz="2000" b="0" i="0" u="none" strike="noStrike" dirty="0">
                           <a:solidFill>
-                            <a:srgbClr val="000000"/>
+                            <a:schemeClr val="tx2"/>
                           </a:solidFill>
                           <a:effectLst/>
                           <a:latin typeface="Century" panose="02040604050505020304" pitchFamily="18" charset="0"/>
@@ -7348,6 +7366,9 @@
                         <a:t>99.58%</a:t>
                       </a:r>
                       <a:endParaRPr lang="en-US" sz="3600" dirty="0">
+                        <a:solidFill>
+                          <a:schemeClr val="tx2"/>
+                        </a:solidFill>
                         <a:effectLst/>
                       </a:endParaRPr>
                     </a:p>
@@ -7403,7 +7424,7 @@
                       <a:r>
                         <a:rPr lang="en-US" sz="2000" b="0" i="0" u="none" strike="noStrike">
                           <a:solidFill>
-                            <a:srgbClr val="000000"/>
+                            <a:schemeClr val="tx2"/>
                           </a:solidFill>
                           <a:effectLst/>
                           <a:latin typeface="Century" panose="02040604050505020304" pitchFamily="18" charset="0"/>
@@ -7411,6 +7432,9 @@
                         <a:t>99.62%</a:t>
                       </a:r>
                       <a:endParaRPr lang="en-US" sz="3600">
+                        <a:solidFill>
+                          <a:schemeClr val="tx2"/>
+                        </a:solidFill>
                         <a:effectLst/>
                       </a:endParaRPr>
                     </a:p>
@@ -7466,7 +7490,7 @@
                       <a:r>
                         <a:rPr lang="en-US" sz="2000" b="0" i="0" u="none" strike="noStrike">
                           <a:solidFill>
-                            <a:srgbClr val="000000"/>
+                            <a:schemeClr val="tx2"/>
                           </a:solidFill>
                           <a:effectLst/>
                           <a:latin typeface="Century" panose="02040604050505020304" pitchFamily="18" charset="0"/>
@@ -7474,6 +7498,9 @@
                         <a:t>99.58%</a:t>
                       </a:r>
                       <a:endParaRPr lang="en-US" sz="3600">
+                        <a:solidFill>
+                          <a:schemeClr val="tx2"/>
+                        </a:solidFill>
                         <a:effectLst/>
                       </a:endParaRPr>
                     </a:p>
@@ -7529,7 +7556,7 @@
                       <a:r>
                         <a:rPr lang="en-US" sz="2000" b="0" i="0" u="none" strike="noStrike">
                           <a:solidFill>
-                            <a:srgbClr val="000000"/>
+                            <a:schemeClr val="tx2"/>
                           </a:solidFill>
                           <a:effectLst/>
                           <a:latin typeface="Century" panose="02040604050505020304" pitchFamily="18" charset="0"/>
@@ -7537,6 +7564,9 @@
                         <a:t>99.58%</a:t>
                       </a:r>
                       <a:endParaRPr lang="en-US" sz="3600">
+                        <a:solidFill>
+                          <a:schemeClr val="tx2"/>
+                        </a:solidFill>
                         <a:effectLst/>
                       </a:endParaRPr>
                     </a:p>
@@ -7597,16 +7627,19 @@
                         <a:buNone/>
                       </a:pPr>
                       <a:r>
-                        <a:rPr lang="en-US" sz="2000" b="0" i="0" u="none" strike="noStrike">
+                        <a:rPr lang="en-US" sz="2000" b="0" i="0" u="none" strike="noStrike" dirty="0">
                           <a:solidFill>
-                            <a:srgbClr val="000000"/>
+                            <a:schemeClr val="tx2"/>
                           </a:solidFill>
                           <a:effectLst/>
                           <a:latin typeface="Century" panose="02040604050505020304" pitchFamily="18" charset="0"/>
                         </a:rPr>
                         <a:t>SVM (Linear)</a:t>
                       </a:r>
-                      <a:endParaRPr lang="en-US" sz="3600">
+                      <a:endParaRPr lang="en-US" sz="3600" dirty="0">
+                        <a:solidFill>
+                          <a:schemeClr val="tx2"/>
+                        </a:solidFill>
                         <a:effectLst/>
                       </a:endParaRPr>
                     </a:p>
@@ -7662,7 +7695,7 @@
                       <a:r>
                         <a:rPr lang="en-US" sz="2000" b="0" i="0" u="none" strike="noStrike">
                           <a:solidFill>
-                            <a:srgbClr val="000000"/>
+                            <a:schemeClr val="tx2"/>
                           </a:solidFill>
                           <a:effectLst/>
                           <a:latin typeface="Century" panose="02040604050505020304" pitchFamily="18" charset="0"/>
@@ -7670,6 +7703,9 @@
                         <a:t>99.58%</a:t>
                       </a:r>
                       <a:endParaRPr lang="en-US" sz="3600">
+                        <a:solidFill>
+                          <a:schemeClr val="tx2"/>
+                        </a:solidFill>
                         <a:effectLst/>
                       </a:endParaRPr>
                     </a:p>
@@ -7725,7 +7761,7 @@
                       <a:r>
                         <a:rPr lang="en-US" sz="2000" b="0" i="0" u="none" strike="noStrike">
                           <a:solidFill>
-                            <a:srgbClr val="000000"/>
+                            <a:schemeClr val="tx2"/>
                           </a:solidFill>
                           <a:effectLst/>
                           <a:latin typeface="Century" panose="02040604050505020304" pitchFamily="18" charset="0"/>
@@ -7733,6 +7769,9 @@
                         <a:t>99.62%</a:t>
                       </a:r>
                       <a:endParaRPr lang="en-US" sz="3600">
+                        <a:solidFill>
+                          <a:schemeClr val="tx2"/>
+                        </a:solidFill>
                         <a:effectLst/>
                       </a:endParaRPr>
                     </a:p>
@@ -7788,7 +7827,7 @@
                       <a:r>
                         <a:rPr lang="en-US" sz="2000" b="0" i="0" u="none" strike="noStrike">
                           <a:solidFill>
-                            <a:srgbClr val="000000"/>
+                            <a:schemeClr val="tx2"/>
                           </a:solidFill>
                           <a:effectLst/>
                           <a:latin typeface="Century" panose="02040604050505020304" pitchFamily="18" charset="0"/>
@@ -7796,6 +7835,9 @@
                         <a:t>99.58%</a:t>
                       </a:r>
                       <a:endParaRPr lang="en-US" sz="3600">
+                        <a:solidFill>
+                          <a:schemeClr val="tx2"/>
+                        </a:solidFill>
                         <a:effectLst/>
                       </a:endParaRPr>
                     </a:p>
@@ -7851,7 +7893,7 @@
                       <a:r>
                         <a:rPr lang="en-US" sz="2000" b="0" i="0" u="none" strike="noStrike">
                           <a:solidFill>
-                            <a:srgbClr val="000000"/>
+                            <a:schemeClr val="tx2"/>
                           </a:solidFill>
                           <a:effectLst/>
                           <a:latin typeface="Century" panose="02040604050505020304" pitchFamily="18" charset="0"/>
@@ -7859,6 +7901,9 @@
                         <a:t>99.58%</a:t>
                       </a:r>
                       <a:endParaRPr lang="en-US" sz="3600">
+                        <a:solidFill>
+                          <a:schemeClr val="tx2"/>
+                        </a:solidFill>
                         <a:effectLst/>
                       </a:endParaRPr>
                     </a:p>
@@ -7921,7 +7966,7 @@
                       <a:r>
                         <a:rPr lang="en-US" sz="2000" b="0" i="0" u="none" strike="noStrike">
                           <a:solidFill>
-                            <a:srgbClr val="000000"/>
+                            <a:schemeClr val="tx2"/>
                           </a:solidFill>
                           <a:effectLst/>
                           <a:latin typeface="Century" panose="02040604050505020304" pitchFamily="18" charset="0"/>
@@ -7929,6 +7974,9 @@
                         <a:t>SVM (RBF)</a:t>
                       </a:r>
                       <a:endParaRPr lang="en-US" sz="3600">
+                        <a:solidFill>
+                          <a:schemeClr val="tx2"/>
+                        </a:solidFill>
                         <a:effectLst/>
                       </a:endParaRPr>
                     </a:p>
@@ -7984,7 +8032,7 @@
                       <a:r>
                         <a:rPr lang="en-US" sz="2000" b="0" i="0" u="none" strike="noStrike">
                           <a:solidFill>
-                            <a:srgbClr val="000000"/>
+                            <a:schemeClr val="tx2"/>
                           </a:solidFill>
                           <a:effectLst/>
                           <a:latin typeface="Century" panose="02040604050505020304" pitchFamily="18" charset="0"/>
@@ -7992,6 +8040,9 @@
                         <a:t>99.58%</a:t>
                       </a:r>
                       <a:endParaRPr lang="en-US" sz="3600">
+                        <a:solidFill>
+                          <a:schemeClr val="tx2"/>
+                        </a:solidFill>
                         <a:effectLst/>
                       </a:endParaRPr>
                     </a:p>
@@ -8047,7 +8098,7 @@
                       <a:r>
                         <a:rPr lang="en-US" sz="2000" b="0" i="0" u="none" strike="noStrike">
                           <a:solidFill>
-                            <a:srgbClr val="000000"/>
+                            <a:schemeClr val="tx2"/>
                           </a:solidFill>
                           <a:effectLst/>
                           <a:latin typeface="Century" panose="02040604050505020304" pitchFamily="18" charset="0"/>
@@ -8055,6 +8106,9 @@
                         <a:t>99.62%</a:t>
                       </a:r>
                       <a:endParaRPr lang="en-US" sz="3600">
+                        <a:solidFill>
+                          <a:schemeClr val="tx2"/>
+                        </a:solidFill>
                         <a:effectLst/>
                       </a:endParaRPr>
                     </a:p>
@@ -8110,7 +8164,7 @@
                       <a:r>
                         <a:rPr lang="en-US" sz="2000" b="0" i="0" u="none" strike="noStrike">
                           <a:solidFill>
-                            <a:srgbClr val="000000"/>
+                            <a:schemeClr val="tx2"/>
                           </a:solidFill>
                           <a:effectLst/>
                           <a:latin typeface="Century" panose="02040604050505020304" pitchFamily="18" charset="0"/>
@@ -8118,6 +8172,9 @@
                         <a:t>99.58%</a:t>
                       </a:r>
                       <a:endParaRPr lang="en-US" sz="3600">
+                        <a:solidFill>
+                          <a:schemeClr val="tx2"/>
+                        </a:solidFill>
                         <a:effectLst/>
                       </a:endParaRPr>
                     </a:p>
@@ -8173,7 +8230,7 @@
                       <a:r>
                         <a:rPr lang="en-US" sz="2000" b="0" i="0" u="none" strike="noStrike">
                           <a:solidFill>
-                            <a:srgbClr val="000000"/>
+                            <a:schemeClr val="tx2"/>
                           </a:solidFill>
                           <a:effectLst/>
                           <a:latin typeface="Century" panose="02040604050505020304" pitchFamily="18" charset="0"/>
@@ -8181,6 +8238,9 @@
                         <a:t>99.58%</a:t>
                       </a:r>
                       <a:endParaRPr lang="en-US" sz="3600">
+                        <a:solidFill>
+                          <a:schemeClr val="tx2"/>
+                        </a:solidFill>
                         <a:effectLst/>
                       </a:endParaRPr>
                     </a:p>
@@ -8243,7 +8303,7 @@
                       <a:r>
                         <a:rPr lang="en-US" sz="2000" b="0" i="0" u="none" strike="noStrike" dirty="0">
                           <a:solidFill>
-                            <a:srgbClr val="000000"/>
+                            <a:schemeClr val="tx2"/>
                           </a:solidFill>
                           <a:effectLst/>
                           <a:latin typeface="Century" panose="02040604050505020304" pitchFamily="18" charset="0"/>
@@ -8251,6 +8311,9 @@
                         <a:t>Random Forest</a:t>
                       </a:r>
                       <a:endParaRPr lang="en-US" sz="3600" dirty="0">
+                        <a:solidFill>
+                          <a:schemeClr val="tx2"/>
+                        </a:solidFill>
                         <a:effectLst/>
                       </a:endParaRPr>
                     </a:p>
@@ -8306,7 +8369,7 @@
                       <a:r>
                         <a:rPr lang="en-US" sz="2000" b="0" i="0" u="none" strike="noStrike">
                           <a:solidFill>
-                            <a:srgbClr val="000000"/>
+                            <a:schemeClr val="tx2"/>
                           </a:solidFill>
                           <a:effectLst/>
                           <a:latin typeface="Century" panose="02040604050505020304" pitchFamily="18" charset="0"/>
@@ -8314,6 +8377,9 @@
                         <a:t>99.17%</a:t>
                       </a:r>
                       <a:endParaRPr lang="en-US" sz="3600">
+                        <a:solidFill>
+                          <a:schemeClr val="tx2"/>
+                        </a:solidFill>
                         <a:effectLst/>
                       </a:endParaRPr>
                     </a:p>
@@ -8369,7 +8435,7 @@
                       <a:r>
                         <a:rPr lang="en-US" sz="2000" b="0" i="0" u="none" strike="noStrike">
                           <a:solidFill>
-                            <a:srgbClr val="000000"/>
+                            <a:schemeClr val="tx2"/>
                           </a:solidFill>
                           <a:effectLst/>
                           <a:latin typeface="Century" panose="02040604050505020304" pitchFamily="18" charset="0"/>
@@ -8377,6 +8443,9 @@
                         <a:t>99.17%</a:t>
                       </a:r>
                       <a:endParaRPr lang="en-US" sz="3600">
+                        <a:solidFill>
+                          <a:schemeClr val="tx2"/>
+                        </a:solidFill>
                         <a:effectLst/>
                       </a:endParaRPr>
                     </a:p>
@@ -8432,7 +8501,7 @@
                       <a:r>
                         <a:rPr lang="en-US" sz="2000" b="0" i="0" u="none" strike="noStrike" dirty="0">
                           <a:solidFill>
-                            <a:srgbClr val="000000"/>
+                            <a:schemeClr val="tx2"/>
                           </a:solidFill>
                           <a:effectLst/>
                           <a:latin typeface="Century" panose="02040604050505020304" pitchFamily="18" charset="0"/>
@@ -8440,6 +8509,9 @@
                         <a:t>99.17%</a:t>
                       </a:r>
                       <a:endParaRPr lang="en-US" sz="3600" dirty="0">
+                        <a:solidFill>
+                          <a:schemeClr val="tx2"/>
+                        </a:solidFill>
                         <a:effectLst/>
                       </a:endParaRPr>
                     </a:p>
@@ -8495,7 +8567,7 @@
                       <a:r>
                         <a:rPr lang="en-US" sz="2000" b="0" i="0" u="none" strike="noStrike">
                           <a:solidFill>
-                            <a:srgbClr val="000000"/>
+                            <a:schemeClr val="tx2"/>
                           </a:solidFill>
                           <a:effectLst/>
                           <a:latin typeface="Century" panose="02040604050505020304" pitchFamily="18" charset="0"/>
@@ -8503,6 +8575,9 @@
                         <a:t>99.17%</a:t>
                       </a:r>
                       <a:endParaRPr lang="en-US" sz="3600">
+                        <a:solidFill>
+                          <a:schemeClr val="tx2"/>
+                        </a:solidFill>
                         <a:effectLst/>
                       </a:endParaRPr>
                     </a:p>
@@ -8565,7 +8640,7 @@
                       <a:r>
                         <a:rPr lang="en-US" sz="2000" b="1" i="0" u="none" strike="noStrike">
                           <a:solidFill>
-                            <a:srgbClr val="000000"/>
+                            <a:schemeClr val="tx2"/>
                           </a:solidFill>
                           <a:effectLst/>
                           <a:latin typeface="Century" panose="02040604050505020304" pitchFamily="18" charset="0"/>
@@ -8573,6 +8648,9 @@
                         <a:t>Stacking Ensemble</a:t>
                       </a:r>
                       <a:endParaRPr lang="en-US" sz="3600" b="1">
+                        <a:solidFill>
+                          <a:schemeClr val="tx2"/>
+                        </a:solidFill>
                         <a:effectLst/>
                       </a:endParaRPr>
                     </a:p>
@@ -8628,7 +8706,7 @@
                       <a:r>
                         <a:rPr lang="en-US" sz="2000" b="1" i="0" u="none" strike="noStrike">
                           <a:solidFill>
-                            <a:srgbClr val="000000"/>
+                            <a:schemeClr val="tx2"/>
                           </a:solidFill>
                           <a:effectLst/>
                           <a:latin typeface="Century" panose="02040604050505020304" pitchFamily="18" charset="0"/>
@@ -8636,6 +8714,9 @@
                         <a:t>98.33%</a:t>
                       </a:r>
                       <a:endParaRPr lang="en-US" sz="3600" b="1">
+                        <a:solidFill>
+                          <a:schemeClr val="tx2"/>
+                        </a:solidFill>
                         <a:effectLst/>
                       </a:endParaRPr>
                     </a:p>
@@ -8691,7 +8772,7 @@
                       <a:r>
                         <a:rPr lang="en-US" sz="2000" b="1" i="0" u="none" strike="noStrike">
                           <a:solidFill>
-                            <a:srgbClr val="000000"/>
+                            <a:schemeClr val="tx2"/>
                           </a:solidFill>
                           <a:effectLst/>
                           <a:latin typeface="Century" panose="02040604050505020304" pitchFamily="18" charset="0"/>
@@ -8699,6 +8780,9 @@
                         <a:t>98.51%</a:t>
                       </a:r>
                       <a:endParaRPr lang="en-US" sz="3600" b="1">
+                        <a:solidFill>
+                          <a:schemeClr val="tx2"/>
+                        </a:solidFill>
                         <a:effectLst/>
                       </a:endParaRPr>
                     </a:p>
@@ -8754,7 +8838,7 @@
                       <a:r>
                         <a:rPr lang="en-US" sz="2000" b="1" i="0" u="none" strike="noStrike">
                           <a:solidFill>
-                            <a:srgbClr val="000000"/>
+                            <a:schemeClr val="tx2"/>
                           </a:solidFill>
                           <a:effectLst/>
                           <a:latin typeface="Century" panose="02040604050505020304" pitchFamily="18" charset="0"/>
@@ -8762,6 +8846,9 @@
                         <a:t>98.33%</a:t>
                       </a:r>
                       <a:endParaRPr lang="en-US" sz="3600" b="1">
+                        <a:solidFill>
+                          <a:schemeClr val="tx2"/>
+                        </a:solidFill>
                         <a:effectLst/>
                       </a:endParaRPr>
                     </a:p>
@@ -8817,7 +8904,7 @@
                       <a:r>
                         <a:rPr lang="en-US" sz="2000" b="1" i="0" u="none" strike="noStrike" dirty="0">
                           <a:solidFill>
-                            <a:srgbClr val="000000"/>
+                            <a:schemeClr val="tx2"/>
                           </a:solidFill>
                           <a:effectLst/>
                           <a:latin typeface="Century" panose="02040604050505020304" pitchFamily="18" charset="0"/>
@@ -8825,6 +8912,9 @@
                         <a:t>98.32%</a:t>
                       </a:r>
                       <a:endParaRPr lang="en-US" sz="3600" b="1" dirty="0">
+                        <a:solidFill>
+                          <a:schemeClr val="tx2"/>
+                        </a:solidFill>
                         <a:effectLst/>
                       </a:endParaRPr>
                     </a:p>
@@ -8887,7 +8977,7 @@
                       <a:r>
                         <a:rPr lang="en-US" sz="2000" b="0" i="0" u="none" strike="noStrike">
                           <a:solidFill>
-                            <a:srgbClr val="000000"/>
+                            <a:schemeClr val="tx2"/>
                           </a:solidFill>
                           <a:effectLst/>
                           <a:latin typeface="Century" panose="02040604050505020304" pitchFamily="18" charset="0"/>
@@ -8895,6 +8985,9 @@
                         <a:t>XGBoost</a:t>
                       </a:r>
                       <a:endParaRPr lang="en-US" sz="3600">
+                        <a:solidFill>
+                          <a:schemeClr val="tx2"/>
+                        </a:solidFill>
                         <a:effectLst/>
                       </a:endParaRPr>
                     </a:p>
@@ -8950,7 +9043,7 @@
                       <a:r>
                         <a:rPr lang="en-US" sz="2000" b="0" i="0" u="none" strike="noStrike">
                           <a:solidFill>
-                            <a:srgbClr val="000000"/>
+                            <a:schemeClr val="tx2"/>
                           </a:solidFill>
                           <a:effectLst/>
                           <a:latin typeface="Century" panose="02040604050505020304" pitchFamily="18" charset="0"/>
@@ -8958,6 +9051,9 @@
                         <a:t>96.67%</a:t>
                       </a:r>
                       <a:endParaRPr lang="en-US" sz="3600">
+                        <a:solidFill>
+                          <a:schemeClr val="tx2"/>
+                        </a:solidFill>
                         <a:effectLst/>
                       </a:endParaRPr>
                     </a:p>
@@ -9013,7 +9109,7 @@
                       <a:r>
                         <a:rPr lang="en-US" sz="2000" b="0" i="0" u="none" strike="noStrike" dirty="0">
                           <a:solidFill>
-                            <a:srgbClr val="000000"/>
+                            <a:schemeClr val="tx2"/>
                           </a:solidFill>
                           <a:effectLst/>
                           <a:latin typeface="Century" panose="02040604050505020304" pitchFamily="18" charset="0"/>
@@ -9021,6 +9117,9 @@
                         <a:t>97.06%</a:t>
                       </a:r>
                       <a:endParaRPr lang="en-US" sz="3600" dirty="0">
+                        <a:solidFill>
+                          <a:schemeClr val="tx2"/>
+                        </a:solidFill>
                         <a:effectLst/>
                       </a:endParaRPr>
                     </a:p>
@@ -9076,7 +9175,7 @@
                       <a:r>
                         <a:rPr lang="en-US" sz="2000" b="0" i="0" u="none" strike="noStrike">
                           <a:solidFill>
-                            <a:srgbClr val="000000"/>
+                            <a:schemeClr val="tx2"/>
                           </a:solidFill>
                           <a:effectLst/>
                           <a:latin typeface="Century" panose="02040604050505020304" pitchFamily="18" charset="0"/>
@@ -9084,6 +9183,9 @@
                         <a:t>96.67%</a:t>
                       </a:r>
                       <a:endParaRPr lang="en-US" sz="3600">
+                        <a:solidFill>
+                          <a:schemeClr val="tx2"/>
+                        </a:solidFill>
                         <a:effectLst/>
                       </a:endParaRPr>
                     </a:p>
@@ -9139,7 +9241,7 @@
                       <a:r>
                         <a:rPr lang="en-US" sz="2000" b="0" i="0" u="none" strike="noStrike" dirty="0">
                           <a:solidFill>
-                            <a:srgbClr val="000000"/>
+                            <a:schemeClr val="tx2"/>
                           </a:solidFill>
                           <a:effectLst/>
                           <a:latin typeface="Century" panose="02040604050505020304" pitchFamily="18" charset="0"/>
@@ -9147,6 +9249,9 @@
                         <a:t>96.65%</a:t>
                       </a:r>
                       <a:endParaRPr lang="en-US" sz="3600" dirty="0">
+                        <a:solidFill>
+                          <a:schemeClr val="tx2"/>
+                        </a:solidFill>
                         <a:effectLst/>
                       </a:endParaRPr>
                     </a:p>
@@ -9888,7 +9993,7 @@
             <p:ph sz="quarter" idx="13"/>
             <p:extLst>
               <p:ext uri="{D42A27DB-BD31-4B8C-83A1-F6EECF244321}">
-                <p14:modId xmlns:p14="http://schemas.microsoft.com/office/powerpoint/2010/main" val="1832011774"/>
+                <p14:modId xmlns:p14="http://schemas.microsoft.com/office/powerpoint/2010/main" val="3607582574"/>
               </p:ext>
             </p:extLst>
           </p:nvPr>
@@ -10360,7 +10465,7 @@
                       <a:r>
                         <a:rPr lang="en-US" sz="1600" b="0" i="0" u="none" strike="noStrike">
                           <a:solidFill>
-                            <a:srgbClr val="000000"/>
+                            <a:schemeClr val="tx2"/>
                           </a:solidFill>
                           <a:effectLst/>
                           <a:latin typeface="Century" panose="02040604050505020304" pitchFamily="18" charset="0"/>
@@ -10368,6 +10473,9 @@
                         <a:t>Naive Bayes</a:t>
                       </a:r>
                       <a:endParaRPr lang="en-US" sz="1600">
+                        <a:solidFill>
+                          <a:schemeClr val="tx2"/>
+                        </a:solidFill>
                         <a:effectLst/>
                       </a:endParaRPr>
                     </a:p>
@@ -10423,7 +10531,7 @@
                       <a:r>
                         <a:rPr lang="en-US" sz="1600" b="0" i="0" u="none" strike="noStrike" dirty="0">
                           <a:solidFill>
-                            <a:srgbClr val="000000"/>
+                            <a:schemeClr val="tx2"/>
                           </a:solidFill>
                           <a:effectLst/>
                           <a:latin typeface="Century" panose="02040604050505020304" pitchFamily="18" charset="0"/>
@@ -10431,6 +10539,9 @@
                         <a:t>97.25%</a:t>
                       </a:r>
                       <a:endParaRPr lang="en-US" sz="1600" dirty="0">
+                        <a:solidFill>
+                          <a:schemeClr val="tx2"/>
+                        </a:solidFill>
                         <a:effectLst/>
                       </a:endParaRPr>
                     </a:p>
@@ -10486,7 +10597,7 @@
                       <a:r>
                         <a:rPr lang="en-US" sz="1600" b="0" i="0" u="none" strike="noStrike" dirty="0">
                           <a:solidFill>
-                            <a:srgbClr val="000000"/>
+                            <a:schemeClr val="tx2"/>
                           </a:solidFill>
                           <a:effectLst/>
                           <a:latin typeface="Century" panose="02040604050505020304" pitchFamily="18" charset="0"/>
@@ -10494,6 +10605,9 @@
                         <a:t>0.73%</a:t>
                       </a:r>
                       <a:endParaRPr lang="en-US" sz="1600" dirty="0">
+                        <a:solidFill>
+                          <a:schemeClr val="tx2"/>
+                        </a:solidFill>
                         <a:effectLst/>
                       </a:endParaRPr>
                     </a:p>
@@ -10549,7 +10663,7 @@
                       <a:r>
                         <a:rPr lang="en-US" sz="1600" b="0" i="0" u="none" strike="noStrike">
                           <a:solidFill>
-                            <a:srgbClr val="000000"/>
+                            <a:schemeClr val="tx2"/>
                           </a:solidFill>
                           <a:effectLst/>
                           <a:latin typeface="Century" panose="02040604050505020304" pitchFamily="18" charset="0"/>
@@ -10557,6 +10671,9 @@
                         <a:t>97.46%</a:t>
                       </a:r>
                       <a:endParaRPr lang="en-US" sz="1600">
+                        <a:solidFill>
+                          <a:schemeClr val="tx2"/>
+                        </a:solidFill>
                         <a:effectLst/>
                       </a:endParaRPr>
                     </a:p>
@@ -10612,7 +10729,7 @@
                       <a:r>
                         <a:rPr lang="en-US" sz="1600" b="0" i="0" u="none" strike="noStrike">
                           <a:solidFill>
-                            <a:srgbClr val="000000"/>
+                            <a:schemeClr val="tx2"/>
                           </a:solidFill>
                           <a:effectLst/>
                           <a:latin typeface="Century" panose="02040604050505020304" pitchFamily="18" charset="0"/>
@@ -10620,6 +10737,9 @@
                         <a:t>97.25%</a:t>
                       </a:r>
                       <a:endParaRPr lang="en-US" sz="1600">
+                        <a:solidFill>
+                          <a:schemeClr val="tx2"/>
+                        </a:solidFill>
                         <a:effectLst/>
                       </a:endParaRPr>
                     </a:p>
@@ -10675,7 +10795,7 @@
                       <a:r>
                         <a:rPr lang="en-US" sz="1600" b="0" i="0" u="none" strike="noStrike">
                           <a:solidFill>
-                            <a:srgbClr val="000000"/>
+                            <a:schemeClr val="tx2"/>
                           </a:solidFill>
                           <a:effectLst/>
                           <a:latin typeface="Century" panose="02040604050505020304" pitchFamily="18" charset="0"/>
@@ -10683,6 +10803,9 @@
                         <a:t>97.24%</a:t>
                       </a:r>
                       <a:endParaRPr lang="en-US" sz="1600">
+                        <a:solidFill>
+                          <a:schemeClr val="tx2"/>
+                        </a:solidFill>
                         <a:effectLst/>
                       </a:endParaRPr>
                     </a:p>
@@ -10745,7 +10868,7 @@
                       <a:r>
                         <a:rPr lang="en-US" sz="1600" b="0" i="0" u="none" strike="noStrike">
                           <a:solidFill>
-                            <a:srgbClr val="000000"/>
+                            <a:schemeClr val="tx2"/>
                           </a:solidFill>
                           <a:effectLst/>
                           <a:latin typeface="Century" panose="02040604050505020304" pitchFamily="18" charset="0"/>
@@ -10753,6 +10876,9 @@
                         <a:t>Logistic Regression</a:t>
                       </a:r>
                       <a:endParaRPr lang="en-US" sz="1600">
+                        <a:solidFill>
+                          <a:schemeClr val="tx2"/>
+                        </a:solidFill>
                         <a:effectLst/>
                       </a:endParaRPr>
                     </a:p>
@@ -10808,7 +10934,7 @@
                       <a:r>
                         <a:rPr lang="en-US" sz="1600" b="0" i="0" u="none" strike="noStrike">
                           <a:solidFill>
-                            <a:srgbClr val="000000"/>
+                            <a:schemeClr val="tx2"/>
                           </a:solidFill>
                           <a:effectLst/>
                           <a:latin typeface="Century" panose="02040604050505020304" pitchFamily="18" charset="0"/>
@@ -10816,6 +10942,9 @@
                         <a:t>96.75%</a:t>
                       </a:r>
                       <a:endParaRPr lang="en-US" sz="1600">
+                        <a:solidFill>
+                          <a:schemeClr val="tx2"/>
+                        </a:solidFill>
                         <a:effectLst/>
                       </a:endParaRPr>
                     </a:p>
@@ -10871,7 +11000,7 @@
                       <a:r>
                         <a:rPr lang="en-US" sz="1600" b="0" i="0" u="none" strike="noStrike" dirty="0">
                           <a:solidFill>
-                            <a:srgbClr val="000000"/>
+                            <a:schemeClr val="tx2"/>
                           </a:solidFill>
                           <a:effectLst/>
                           <a:latin typeface="Century" panose="02040604050505020304" pitchFamily="18" charset="0"/>
@@ -10879,6 +11008,9 @@
                         <a:t>0.67%</a:t>
                       </a:r>
                       <a:endParaRPr lang="en-US" sz="1600" dirty="0">
+                        <a:solidFill>
+                          <a:schemeClr val="tx2"/>
+                        </a:solidFill>
                         <a:effectLst/>
                       </a:endParaRPr>
                     </a:p>
@@ -10934,7 +11066,7 @@
                       <a:r>
                         <a:rPr lang="en-US" sz="1600" b="0" i="0" u="none" strike="noStrike" dirty="0">
                           <a:solidFill>
-                            <a:srgbClr val="000000"/>
+                            <a:schemeClr val="tx2"/>
                           </a:solidFill>
                           <a:effectLst/>
                           <a:latin typeface="Century" panose="02040604050505020304" pitchFamily="18" charset="0"/>
@@ -10942,6 +11074,9 @@
                         <a:t>97.12%</a:t>
                       </a:r>
                       <a:endParaRPr lang="en-US" sz="1600" dirty="0">
+                        <a:solidFill>
+                          <a:schemeClr val="tx2"/>
+                        </a:solidFill>
                         <a:effectLst/>
                       </a:endParaRPr>
                     </a:p>
@@ -10997,7 +11132,7 @@
                       <a:r>
                         <a:rPr lang="en-US" sz="1600" b="0" i="0" u="none" strike="noStrike">
                           <a:solidFill>
-                            <a:srgbClr val="000000"/>
+                            <a:schemeClr val="tx2"/>
                           </a:solidFill>
                           <a:effectLst/>
                           <a:latin typeface="Century" panose="02040604050505020304" pitchFamily="18" charset="0"/>
@@ -11005,6 +11140,9 @@
                         <a:t>96.75%</a:t>
                       </a:r>
                       <a:endParaRPr lang="en-US" sz="1600">
+                        <a:solidFill>
+                          <a:schemeClr val="tx2"/>
+                        </a:solidFill>
                         <a:effectLst/>
                       </a:endParaRPr>
                     </a:p>
@@ -11060,7 +11198,7 @@
                       <a:r>
                         <a:rPr lang="en-US" sz="1600" b="0" i="0" u="none" strike="noStrike">
                           <a:solidFill>
-                            <a:srgbClr val="000000"/>
+                            <a:schemeClr val="tx2"/>
                           </a:solidFill>
                           <a:effectLst/>
                           <a:latin typeface="Century" panose="02040604050505020304" pitchFamily="18" charset="0"/>
@@ -11068,6 +11206,9 @@
                         <a:t>96.74%</a:t>
                       </a:r>
                       <a:endParaRPr lang="en-US" sz="1600">
+                        <a:solidFill>
+                          <a:schemeClr val="tx2"/>
+                        </a:solidFill>
                         <a:effectLst/>
                       </a:endParaRPr>
                     </a:p>
@@ -11130,7 +11271,7 @@
                       <a:r>
                         <a:rPr lang="en-US" sz="1600" b="0" i="0" u="none" strike="noStrike">
                           <a:solidFill>
-                            <a:srgbClr val="000000"/>
+                            <a:schemeClr val="tx2"/>
                           </a:solidFill>
                           <a:effectLst/>
                           <a:latin typeface="Century" panose="02040604050505020304" pitchFamily="18" charset="0"/>
@@ -11138,6 +11279,9 @@
                         <a:t>SVM (RBF)</a:t>
                       </a:r>
                       <a:endParaRPr lang="en-US" sz="1600">
+                        <a:solidFill>
+                          <a:schemeClr val="tx2"/>
+                        </a:solidFill>
                         <a:effectLst/>
                       </a:endParaRPr>
                     </a:p>
@@ -11193,7 +11337,7 @@
                       <a:r>
                         <a:rPr lang="en-US" sz="1600" b="0" i="0" u="none" strike="noStrike">
                           <a:solidFill>
-                            <a:srgbClr val="000000"/>
+                            <a:schemeClr val="tx2"/>
                           </a:solidFill>
                           <a:effectLst/>
                           <a:latin typeface="Century" panose="02040604050505020304" pitchFamily="18" charset="0"/>
@@ -11201,6 +11345,9 @@
                         <a:t>96.50%</a:t>
                       </a:r>
                       <a:endParaRPr lang="en-US" sz="1600">
+                        <a:solidFill>
+                          <a:schemeClr val="tx2"/>
+                        </a:solidFill>
                         <a:effectLst/>
                       </a:endParaRPr>
                     </a:p>
@@ -11256,7 +11403,7 @@
                       <a:r>
                         <a:rPr lang="en-US" sz="1600" b="0" i="0" u="none" strike="noStrike" dirty="0">
                           <a:solidFill>
-                            <a:srgbClr val="000000"/>
+                            <a:schemeClr val="tx2"/>
                           </a:solidFill>
                           <a:effectLst/>
                           <a:latin typeface="Century" panose="02040604050505020304" pitchFamily="18" charset="0"/>
@@ -11264,6 +11411,9 @@
                         <a:t>0.86%</a:t>
                       </a:r>
                       <a:endParaRPr lang="en-US" sz="1600" dirty="0">
+                        <a:solidFill>
+                          <a:schemeClr val="tx2"/>
+                        </a:solidFill>
                         <a:effectLst/>
                       </a:endParaRPr>
                     </a:p>
@@ -11319,7 +11469,7 @@
                       <a:r>
                         <a:rPr lang="en-US" sz="1600" b="0" i="0" u="none" strike="noStrike" dirty="0">
                           <a:solidFill>
-                            <a:srgbClr val="000000"/>
+                            <a:schemeClr val="tx2"/>
                           </a:solidFill>
                           <a:effectLst/>
                           <a:latin typeface="Century" panose="02040604050505020304" pitchFamily="18" charset="0"/>
@@ -11327,6 +11477,9 @@
                         <a:t>96.90%</a:t>
                       </a:r>
                       <a:endParaRPr lang="en-US" sz="1600" dirty="0">
+                        <a:solidFill>
+                          <a:schemeClr val="tx2"/>
+                        </a:solidFill>
                         <a:effectLst/>
                       </a:endParaRPr>
                     </a:p>
@@ -11382,7 +11535,7 @@
                       <a:r>
                         <a:rPr lang="en-US" sz="1600" b="0" i="0" u="none" strike="noStrike">
                           <a:solidFill>
-                            <a:srgbClr val="000000"/>
+                            <a:schemeClr val="tx2"/>
                           </a:solidFill>
                           <a:effectLst/>
                           <a:latin typeface="Century" panose="02040604050505020304" pitchFamily="18" charset="0"/>
@@ -11390,6 +11543,9 @@
                         <a:t>96.50%</a:t>
                       </a:r>
                       <a:endParaRPr lang="en-US" sz="1600">
+                        <a:solidFill>
+                          <a:schemeClr val="tx2"/>
+                        </a:solidFill>
                         <a:effectLst/>
                       </a:endParaRPr>
                     </a:p>
@@ -11445,7 +11601,7 @@
                       <a:r>
                         <a:rPr lang="en-US" sz="1600" b="0" i="0" u="none" strike="noStrike">
                           <a:solidFill>
-                            <a:srgbClr val="000000"/>
+                            <a:schemeClr val="tx2"/>
                           </a:solidFill>
                           <a:effectLst/>
                           <a:latin typeface="Century" panose="02040604050505020304" pitchFamily="18" charset="0"/>
@@ -11453,6 +11609,9 @@
                         <a:t>96.52%</a:t>
                       </a:r>
                       <a:endParaRPr lang="en-US" sz="1600">
+                        <a:solidFill>
+                          <a:schemeClr val="tx2"/>
+                        </a:solidFill>
                         <a:effectLst/>
                       </a:endParaRPr>
                     </a:p>
@@ -11515,7 +11674,7 @@
                       <a:r>
                         <a:rPr lang="en-US" sz="1600" b="0" i="0" u="none" strike="noStrike">
                           <a:solidFill>
-                            <a:srgbClr val="000000"/>
+                            <a:schemeClr val="tx2"/>
                           </a:solidFill>
                           <a:effectLst/>
                           <a:latin typeface="Century" panose="02040604050505020304" pitchFamily="18" charset="0"/>
@@ -11523,6 +11682,9 @@
                         <a:t>SVM (Linear)</a:t>
                       </a:r>
                       <a:endParaRPr lang="en-US" sz="1600">
+                        <a:solidFill>
+                          <a:schemeClr val="tx2"/>
+                        </a:solidFill>
                         <a:effectLst/>
                       </a:endParaRPr>
                     </a:p>
@@ -11578,7 +11740,7 @@
                       <a:r>
                         <a:rPr lang="en-US" sz="1600" b="0" i="0" u="none" strike="noStrike" dirty="0">
                           <a:solidFill>
-                            <a:srgbClr val="000000"/>
+                            <a:schemeClr val="tx2"/>
                           </a:solidFill>
                           <a:effectLst/>
                           <a:latin typeface="Century" panose="02040604050505020304" pitchFamily="18" charset="0"/>
@@ -11586,6 +11748,9 @@
                         <a:t>96.25%</a:t>
                       </a:r>
                       <a:endParaRPr lang="en-US" sz="1600" dirty="0">
+                        <a:solidFill>
+                          <a:schemeClr val="tx2"/>
+                        </a:solidFill>
                         <a:effectLst/>
                       </a:endParaRPr>
                     </a:p>
@@ -11641,7 +11806,7 @@
                       <a:r>
                         <a:rPr lang="en-US" sz="1600" b="0" i="0" u="none" strike="noStrike">
                           <a:solidFill>
-                            <a:srgbClr val="000000"/>
+                            <a:schemeClr val="tx2"/>
                           </a:solidFill>
                           <a:effectLst/>
                           <a:latin typeface="Century" panose="02040604050505020304" pitchFamily="18" charset="0"/>
@@ -11649,6 +11814,9 @@
                         <a:t>0.70%</a:t>
                       </a:r>
                       <a:endParaRPr lang="en-US" sz="1600">
+                        <a:solidFill>
+                          <a:schemeClr val="tx2"/>
+                        </a:solidFill>
                         <a:effectLst/>
                       </a:endParaRPr>
                     </a:p>
@@ -11704,7 +11872,7 @@
                       <a:r>
                         <a:rPr lang="en-US" sz="1600" b="0" i="0" u="none" strike="noStrike" dirty="0">
                           <a:solidFill>
-                            <a:srgbClr val="000000"/>
+                            <a:schemeClr val="tx2"/>
                           </a:solidFill>
                           <a:effectLst/>
                           <a:latin typeface="Century" panose="02040604050505020304" pitchFamily="18" charset="0"/>
@@ -11712,6 +11880,9 @@
                         <a:t>96.63%</a:t>
                       </a:r>
                       <a:endParaRPr lang="en-US" sz="1600" dirty="0">
+                        <a:solidFill>
+                          <a:schemeClr val="tx2"/>
+                        </a:solidFill>
                         <a:effectLst/>
                       </a:endParaRPr>
                     </a:p>
@@ -11767,7 +11938,7 @@
                       <a:r>
                         <a:rPr lang="en-US" sz="1600" b="0" i="0" u="none" strike="noStrike" dirty="0">
                           <a:solidFill>
-                            <a:srgbClr val="000000"/>
+                            <a:schemeClr val="tx2"/>
                           </a:solidFill>
                           <a:effectLst/>
                           <a:latin typeface="Century" panose="02040604050505020304" pitchFamily="18" charset="0"/>
@@ -11775,6 +11946,9 @@
                         <a:t>96.25%</a:t>
                       </a:r>
                       <a:endParaRPr lang="en-US" sz="1600" dirty="0">
+                        <a:solidFill>
+                          <a:schemeClr val="tx2"/>
+                        </a:solidFill>
                         <a:effectLst/>
                       </a:endParaRPr>
                     </a:p>
@@ -11830,7 +12004,7 @@
                       <a:r>
                         <a:rPr lang="en-US" sz="1600" b="0" i="0" u="none" strike="noStrike">
                           <a:solidFill>
-                            <a:srgbClr val="000000"/>
+                            <a:schemeClr val="tx2"/>
                           </a:solidFill>
                           <a:effectLst/>
                           <a:latin typeface="Century" panose="02040604050505020304" pitchFamily="18" charset="0"/>
@@ -11838,6 +12012,9 @@
                         <a:t>96.27%</a:t>
                       </a:r>
                       <a:endParaRPr lang="en-US" sz="1600">
+                        <a:solidFill>
+                          <a:schemeClr val="tx2"/>
+                        </a:solidFill>
                         <a:effectLst/>
                       </a:endParaRPr>
                     </a:p>
@@ -11900,7 +12077,7 @@
                       <a:r>
                         <a:rPr lang="en-US" sz="1600" b="1" i="0" u="none" strike="noStrike">
                           <a:solidFill>
-                            <a:srgbClr val="000000"/>
+                            <a:schemeClr val="tx2"/>
                           </a:solidFill>
                           <a:effectLst/>
                           <a:latin typeface="Century" panose="02040604050505020304" pitchFamily="18" charset="0"/>
@@ -11908,6 +12085,9 @@
                         <a:t>Stacking Ensemble</a:t>
                       </a:r>
                       <a:endParaRPr lang="en-US" sz="1600" b="1">
+                        <a:solidFill>
+                          <a:schemeClr val="tx2"/>
+                        </a:solidFill>
                         <a:effectLst/>
                       </a:endParaRPr>
                     </a:p>
@@ -11963,7 +12143,7 @@
                       <a:r>
                         <a:rPr lang="en-US" sz="1600" b="1" i="0" u="none" strike="noStrike" dirty="0">
                           <a:solidFill>
-                            <a:srgbClr val="000000"/>
+                            <a:schemeClr val="tx2"/>
                           </a:solidFill>
                           <a:effectLst/>
                           <a:latin typeface="Century" panose="02040604050505020304" pitchFamily="18" charset="0"/>
@@ -11971,6 +12151,9 @@
                         <a:t>96.00%</a:t>
                       </a:r>
                       <a:endParaRPr lang="en-US" sz="1600" b="1" dirty="0">
+                        <a:solidFill>
+                          <a:schemeClr val="tx2"/>
+                        </a:solidFill>
                         <a:effectLst/>
                       </a:endParaRPr>
                     </a:p>
@@ -12026,7 +12209,7 @@
                       <a:r>
                         <a:rPr lang="en-US" sz="1600" b="1" i="0" u="none" strike="noStrike">
                           <a:solidFill>
-                            <a:srgbClr val="000000"/>
+                            <a:schemeClr val="tx2"/>
                           </a:solidFill>
                           <a:effectLst/>
                           <a:latin typeface="Century" panose="02040604050505020304" pitchFamily="18" charset="0"/>
@@ -12034,6 +12217,9 @@
                         <a:t>0.20%</a:t>
                       </a:r>
                       <a:endParaRPr lang="en-US" sz="1600" b="1">
+                        <a:solidFill>
+                          <a:schemeClr val="tx2"/>
+                        </a:solidFill>
                         <a:effectLst/>
                       </a:endParaRPr>
                     </a:p>
@@ -12089,7 +12275,7 @@
                       <a:r>
                         <a:rPr lang="en-US" sz="1600" b="1" i="0" u="none" strike="noStrike">
                           <a:solidFill>
-                            <a:srgbClr val="000000"/>
+                            <a:schemeClr val="tx2"/>
                           </a:solidFill>
                           <a:effectLst/>
                           <a:latin typeface="Century" panose="02040604050505020304" pitchFamily="18" charset="0"/>
@@ -12097,6 +12283,9 @@
                         <a:t>96.42%</a:t>
                       </a:r>
                       <a:endParaRPr lang="en-US" sz="1600" b="1">
+                        <a:solidFill>
+                          <a:schemeClr val="tx2"/>
+                        </a:solidFill>
                         <a:effectLst/>
                       </a:endParaRPr>
                     </a:p>
@@ -12152,7 +12341,7 @@
                       <a:r>
                         <a:rPr lang="en-US" sz="1600" b="1" i="0" u="none" strike="noStrike" dirty="0">
                           <a:solidFill>
-                            <a:srgbClr val="000000"/>
+                            <a:schemeClr val="tx2"/>
                           </a:solidFill>
                           <a:effectLst/>
                           <a:latin typeface="Century" panose="02040604050505020304" pitchFamily="18" charset="0"/>
@@ -12160,6 +12349,9 @@
                         <a:t>96.00%</a:t>
                       </a:r>
                       <a:endParaRPr lang="en-US" sz="1600" b="1" dirty="0">
+                        <a:solidFill>
+                          <a:schemeClr val="tx2"/>
+                        </a:solidFill>
                         <a:effectLst/>
                       </a:endParaRPr>
                     </a:p>
@@ -12215,7 +12407,7 @@
                       <a:r>
                         <a:rPr lang="en-US" sz="1600" b="1" i="0" u="none" strike="noStrike" dirty="0">
                           <a:solidFill>
-                            <a:srgbClr val="000000"/>
+                            <a:schemeClr val="tx2"/>
                           </a:solidFill>
                           <a:effectLst/>
                           <a:latin typeface="Century" panose="02040604050505020304" pitchFamily="18" charset="0"/>
@@ -12223,6 +12415,9 @@
                         <a:t>95.97%</a:t>
                       </a:r>
                       <a:endParaRPr lang="en-US" sz="1600" b="1" dirty="0">
+                        <a:solidFill>
+                          <a:schemeClr val="tx2"/>
+                        </a:solidFill>
                         <a:effectLst/>
                       </a:endParaRPr>
                     </a:p>
@@ -12285,7 +12480,7 @@
                       <a:r>
                         <a:rPr lang="en-US" sz="1600" b="0" i="0" u="none" strike="noStrike">
                           <a:solidFill>
-                            <a:srgbClr val="000000"/>
+                            <a:schemeClr val="tx2"/>
                           </a:solidFill>
                           <a:effectLst/>
                           <a:latin typeface="Century" panose="02040604050505020304" pitchFamily="18" charset="0"/>
@@ -12293,6 +12488,9 @@
                         <a:t>Random Forest</a:t>
                       </a:r>
                       <a:endParaRPr lang="en-US" sz="1600">
+                        <a:solidFill>
+                          <a:schemeClr val="tx2"/>
+                        </a:solidFill>
                         <a:effectLst/>
                       </a:endParaRPr>
                     </a:p>
@@ -12348,7 +12546,7 @@
                       <a:r>
                         <a:rPr lang="en-US" sz="1600" b="0" i="0" u="none" strike="noStrike" dirty="0">
                           <a:solidFill>
-                            <a:srgbClr val="000000"/>
+                            <a:schemeClr val="tx2"/>
                           </a:solidFill>
                           <a:effectLst/>
                           <a:latin typeface="Century" panose="02040604050505020304" pitchFamily="18" charset="0"/>
@@ -12356,6 +12554,9 @@
                         <a:t>95.42%</a:t>
                       </a:r>
                       <a:endParaRPr lang="en-US" sz="1600" dirty="0">
+                        <a:solidFill>
+                          <a:schemeClr val="tx2"/>
+                        </a:solidFill>
                         <a:effectLst/>
                       </a:endParaRPr>
                     </a:p>
@@ -12411,7 +12612,7 @@
                       <a:r>
                         <a:rPr lang="en-US" sz="1600" b="0" i="0" u="none" strike="noStrike">
                           <a:solidFill>
-                            <a:srgbClr val="000000"/>
+                            <a:schemeClr val="tx2"/>
                           </a:solidFill>
                           <a:effectLst/>
                           <a:latin typeface="Century" panose="02040604050505020304" pitchFamily="18" charset="0"/>
@@ -12419,6 +12620,9 @@
                         <a:t>0.95%</a:t>
                       </a:r>
                       <a:endParaRPr lang="en-US" sz="1600">
+                        <a:solidFill>
+                          <a:schemeClr val="tx2"/>
+                        </a:solidFill>
                         <a:effectLst/>
                       </a:endParaRPr>
                     </a:p>
@@ -12474,7 +12678,7 @@
                       <a:r>
                         <a:rPr lang="en-US" sz="1600" b="0" i="0" u="none" strike="noStrike">
                           <a:solidFill>
-                            <a:srgbClr val="000000"/>
+                            <a:schemeClr val="tx2"/>
                           </a:solidFill>
                           <a:effectLst/>
                           <a:latin typeface="Century" panose="02040604050505020304" pitchFamily="18" charset="0"/>
@@ -12482,6 +12686,9 @@
                         <a:t>96.02%</a:t>
                       </a:r>
                       <a:endParaRPr lang="en-US" sz="1600">
+                        <a:solidFill>
+                          <a:schemeClr val="tx2"/>
+                        </a:solidFill>
                         <a:effectLst/>
                       </a:endParaRPr>
                     </a:p>
@@ -12537,7 +12744,7 @@
                       <a:r>
                         <a:rPr lang="en-US" sz="1600" b="0" i="0" u="none" strike="noStrike">
                           <a:solidFill>
-                            <a:srgbClr val="000000"/>
+                            <a:schemeClr val="tx2"/>
                           </a:solidFill>
                           <a:effectLst/>
                           <a:latin typeface="Century" panose="02040604050505020304" pitchFamily="18" charset="0"/>
@@ -12545,6 +12752,9 @@
                         <a:t>95.42%</a:t>
                       </a:r>
                       <a:endParaRPr lang="en-US" sz="1600">
+                        <a:solidFill>
+                          <a:schemeClr val="tx2"/>
+                        </a:solidFill>
                         <a:effectLst/>
                       </a:endParaRPr>
                     </a:p>
@@ -12600,7 +12810,7 @@
                       <a:r>
                         <a:rPr lang="en-US" sz="1600" b="0" i="0" u="none" strike="noStrike" dirty="0">
                           <a:solidFill>
-                            <a:srgbClr val="000000"/>
+                            <a:schemeClr val="tx2"/>
                           </a:solidFill>
                           <a:effectLst/>
                           <a:latin typeface="Century" panose="02040604050505020304" pitchFamily="18" charset="0"/>
@@ -12608,6 +12818,9 @@
                         <a:t>95.37%</a:t>
                       </a:r>
                       <a:endParaRPr lang="en-US" sz="1600" dirty="0">
+                        <a:solidFill>
+                          <a:schemeClr val="tx2"/>
+                        </a:solidFill>
                         <a:effectLst/>
                       </a:endParaRPr>
                     </a:p>
@@ -12670,7 +12883,7 @@
                       <a:r>
                         <a:rPr lang="en-US" sz="1600" b="0" i="0" u="none" strike="noStrike">
                           <a:solidFill>
-                            <a:srgbClr val="000000"/>
+                            <a:schemeClr val="tx2"/>
                           </a:solidFill>
                           <a:effectLst/>
                           <a:latin typeface="Century" panose="02040604050505020304" pitchFamily="18" charset="0"/>
@@ -12678,6 +12891,9 @@
                         <a:t>XGBoost</a:t>
                       </a:r>
                       <a:endParaRPr lang="en-US" sz="1600">
+                        <a:solidFill>
+                          <a:schemeClr val="tx2"/>
+                        </a:solidFill>
                         <a:effectLst/>
                       </a:endParaRPr>
                     </a:p>
@@ -12733,7 +12949,7 @@
                       <a:r>
                         <a:rPr lang="en-US" sz="1600" b="0" i="0" u="none" strike="noStrike">
                           <a:solidFill>
-                            <a:srgbClr val="000000"/>
+                            <a:schemeClr val="tx2"/>
                           </a:solidFill>
                           <a:effectLst/>
                           <a:latin typeface="Century" panose="02040604050505020304" pitchFamily="18" charset="0"/>
@@ -12741,6 +12957,9 @@
                         <a:t>88.83%</a:t>
                       </a:r>
                       <a:endParaRPr lang="en-US" sz="1600">
+                        <a:solidFill>
+                          <a:schemeClr val="tx2"/>
+                        </a:solidFill>
                         <a:effectLst/>
                       </a:endParaRPr>
                     </a:p>
@@ -12796,7 +13015,7 @@
                       <a:r>
                         <a:rPr lang="en-US" sz="1600" b="0" i="0" u="none" strike="noStrike">
                           <a:solidFill>
-                            <a:srgbClr val="000000"/>
+                            <a:schemeClr val="tx2"/>
                           </a:solidFill>
                           <a:effectLst/>
                           <a:latin typeface="Century" panose="02040604050505020304" pitchFamily="18" charset="0"/>
@@ -12804,6 +13023,9 @@
                         <a:t>1.19%</a:t>
                       </a:r>
                       <a:endParaRPr lang="en-US" sz="1600">
+                        <a:solidFill>
+                          <a:schemeClr val="tx2"/>
+                        </a:solidFill>
                         <a:effectLst/>
                       </a:endParaRPr>
                     </a:p>
@@ -12859,7 +13081,7 @@
                       <a:r>
                         <a:rPr lang="en-US" sz="1600" b="0" i="0" u="none" strike="noStrike">
                           <a:solidFill>
-                            <a:srgbClr val="000000"/>
+                            <a:schemeClr val="tx2"/>
                           </a:solidFill>
                           <a:effectLst/>
                           <a:latin typeface="Century" panose="02040604050505020304" pitchFamily="18" charset="0"/>
@@ -12867,6 +13089,9 @@
                         <a:t>89.75%</a:t>
                       </a:r>
                       <a:endParaRPr lang="en-US" sz="1600">
+                        <a:solidFill>
+                          <a:schemeClr val="tx2"/>
+                        </a:solidFill>
                         <a:effectLst/>
                       </a:endParaRPr>
                     </a:p>
@@ -12922,7 +13147,7 @@
                       <a:r>
                         <a:rPr lang="en-US" sz="1600" b="0" i="0" u="none" strike="noStrike">
                           <a:solidFill>
-                            <a:srgbClr val="000000"/>
+                            <a:schemeClr val="tx2"/>
                           </a:solidFill>
                           <a:effectLst/>
                           <a:latin typeface="Century" panose="02040604050505020304" pitchFamily="18" charset="0"/>
@@ -12930,6 +13155,9 @@
                         <a:t>88.83%</a:t>
                       </a:r>
                       <a:endParaRPr lang="en-US" sz="1600">
+                        <a:solidFill>
+                          <a:schemeClr val="tx2"/>
+                        </a:solidFill>
                         <a:effectLst/>
                       </a:endParaRPr>
                     </a:p>
@@ -12985,7 +13213,7 @@
                       <a:r>
                         <a:rPr lang="en-US" sz="1600" b="0" i="0" u="none" strike="noStrike" dirty="0">
                           <a:solidFill>
-                            <a:srgbClr val="000000"/>
+                            <a:schemeClr val="tx2"/>
                           </a:solidFill>
                           <a:effectLst/>
                           <a:latin typeface="Century" panose="02040604050505020304" pitchFamily="18" charset="0"/>
@@ -12993,6 +13221,9 @@
                         <a:t>88.68%</a:t>
                       </a:r>
                       <a:endParaRPr lang="en-US" sz="1600" dirty="0">
+                        <a:solidFill>
+                          <a:schemeClr val="tx2"/>
+                        </a:solidFill>
                         <a:effectLst/>
                       </a:endParaRPr>
                     </a:p>
@@ -21828,7 +22059,7 @@
             <p:ph sz="quarter" idx="13"/>
             <p:extLst>
               <p:ext uri="{D42A27DB-BD31-4B8C-83A1-F6EECF244321}">
-                <p14:modId xmlns:p14="http://schemas.microsoft.com/office/powerpoint/2010/main" val="55106744"/>
+                <p14:modId xmlns:p14="http://schemas.microsoft.com/office/powerpoint/2010/main" val="1487641202"/>
               </p:ext>
             </p:extLst>
           </p:nvPr>
@@ -21910,7 +22141,7 @@
                       <a:r>
                         <a:rPr lang="en-US" sz="1400" b="1" i="0" u="none" strike="noStrike">
                           <a:solidFill>
-                            <a:srgbClr val="000000"/>
+                            <a:schemeClr val="tx2"/>
                           </a:solidFill>
                           <a:effectLst/>
                           <a:latin typeface="Century" panose="02040604050505020304" pitchFamily="18" charset="0"/>
@@ -21918,6 +22149,9 @@
                         <a:t>Feature</a:t>
                       </a:r>
                       <a:endParaRPr lang="en-US" sz="3200">
+                        <a:solidFill>
+                          <a:schemeClr val="tx2"/>
+                        </a:solidFill>
                         <a:effectLst/>
                       </a:endParaRPr>
                     </a:p>
@@ -21979,7 +22213,7 @@
                       <a:r>
                         <a:rPr lang="en-US" sz="1400" b="1" i="0" u="none" strike="noStrike">
                           <a:solidFill>
-                            <a:srgbClr val="000000"/>
+                            <a:schemeClr val="tx2"/>
                           </a:solidFill>
                           <a:effectLst/>
                           <a:latin typeface="Century" panose="02040604050505020304" pitchFamily="18" charset="0"/>
@@ -21987,6 +22221,9 @@
                         <a:t>Ada Health</a:t>
                       </a:r>
                       <a:endParaRPr lang="en-US" sz="3200">
+                        <a:solidFill>
+                          <a:schemeClr val="tx2"/>
+                        </a:solidFill>
                         <a:effectLst/>
                       </a:endParaRPr>
                     </a:p>
@@ -22048,7 +22285,7 @@
                       <a:r>
                         <a:rPr lang="en-US" sz="1400" b="1" i="0" u="none" strike="noStrike">
                           <a:solidFill>
-                            <a:srgbClr val="000000"/>
+                            <a:schemeClr val="tx2"/>
                           </a:solidFill>
                           <a:effectLst/>
                           <a:latin typeface="Century" panose="02040604050505020304" pitchFamily="18" charset="0"/>
@@ -22056,6 +22293,9 @@
                         <a:t>Babylon Health</a:t>
                       </a:r>
                       <a:endParaRPr lang="en-US" sz="3200">
+                        <a:solidFill>
+                          <a:schemeClr val="tx2"/>
+                        </a:solidFill>
                         <a:effectLst/>
                       </a:endParaRPr>
                     </a:p>
@@ -22117,7 +22357,7 @@
                       <a:r>
                         <a:rPr lang="en-US" sz="1400" b="1" i="0" u="none" strike="noStrike" dirty="0">
                           <a:solidFill>
-                            <a:srgbClr val="000000"/>
+                            <a:schemeClr val="tx2"/>
                           </a:solidFill>
                           <a:effectLst/>
                           <a:latin typeface="Century" panose="02040604050505020304" pitchFamily="18" charset="0"/>
@@ -22125,6 +22365,9 @@
                         <a:t>Buoy Health</a:t>
                       </a:r>
                       <a:endParaRPr lang="en-US" sz="3200" dirty="0">
+                        <a:solidFill>
+                          <a:schemeClr val="tx2"/>
+                        </a:solidFill>
                         <a:effectLst/>
                       </a:endParaRPr>
                     </a:p>
@@ -22186,7 +22429,7 @@
                       <a:r>
                         <a:rPr lang="en-US" sz="1400" b="1" i="0" u="none" strike="noStrike">
                           <a:solidFill>
-                            <a:srgbClr val="000000"/>
+                            <a:schemeClr val="tx2"/>
                           </a:solidFill>
                           <a:effectLst/>
                           <a:latin typeface="Century" panose="02040604050505020304" pitchFamily="18" charset="0"/>
@@ -22194,6 +22437,9 @@
                         <a:t>WebMD Checker</a:t>
                       </a:r>
                       <a:endParaRPr lang="en-US" sz="3200">
+                        <a:solidFill>
+                          <a:schemeClr val="tx2"/>
+                        </a:solidFill>
                         <a:effectLst/>
                       </a:endParaRPr>
                     </a:p>
@@ -22255,7 +22501,7 @@
                       <a:r>
                         <a:rPr lang="en-US" sz="1400" b="1" i="0" u="none" strike="noStrike">
                           <a:solidFill>
-                            <a:srgbClr val="000000"/>
+                            <a:schemeClr val="tx2"/>
                           </a:solidFill>
                           <a:effectLst/>
                           <a:latin typeface="Century" panose="02040604050505020304" pitchFamily="18" charset="0"/>
@@ -22263,6 +22509,9 @@
                         <a:t>Healthily</a:t>
                       </a:r>
                       <a:endParaRPr lang="en-US" sz="3200">
+                        <a:solidFill>
+                          <a:schemeClr val="tx2"/>
+                        </a:solidFill>
                         <a:effectLst/>
                       </a:endParaRPr>
                     </a:p>
@@ -22324,7 +22573,7 @@
                       <a:r>
                         <a:rPr lang="en-US" sz="1400" b="1" i="0" u="none" strike="noStrike">
                           <a:solidFill>
-                            <a:srgbClr val="000000"/>
+                            <a:schemeClr val="tx2"/>
                           </a:solidFill>
                           <a:effectLst/>
                           <a:latin typeface="Century" panose="02040604050505020304" pitchFamily="18" charset="0"/>
@@ -22332,6 +22581,9 @@
                         <a:t>Proposed System</a:t>
                       </a:r>
                       <a:endParaRPr lang="en-US" sz="3200">
+                        <a:solidFill>
+                          <a:schemeClr val="tx2"/>
+                        </a:solidFill>
                         <a:effectLst/>
                       </a:endParaRPr>
                     </a:p>
@@ -22400,7 +22652,7 @@
                       <a:r>
                         <a:rPr lang="en-US" sz="1400" b="0" i="0" u="none" strike="noStrike">
                           <a:solidFill>
-                            <a:srgbClr val="000000"/>
+                            <a:schemeClr val="tx2"/>
                           </a:solidFill>
                           <a:effectLst/>
                           <a:latin typeface="Century" panose="02040604050505020304" pitchFamily="18" charset="0"/>
@@ -22408,6 +22660,9 @@
                         <a:t>Free-text input</a:t>
                       </a:r>
                       <a:endParaRPr lang="en-US" sz="3200">
+                        <a:solidFill>
+                          <a:schemeClr val="tx2"/>
+                        </a:solidFill>
                         <a:effectLst/>
                       </a:endParaRPr>
                     </a:p>
@@ -22469,7 +22724,7 @@
                       <a:r>
                         <a:rPr lang="en-US" sz="1400" b="0" i="0" u="none" strike="noStrike">
                           <a:solidFill>
-                            <a:srgbClr val="000000"/>
+                            <a:schemeClr val="tx2"/>
                           </a:solidFill>
                           <a:effectLst/>
                           <a:latin typeface="Century" panose="02040604050505020304" pitchFamily="18" charset="0"/>
@@ -22477,6 +22732,9 @@
                         <a:t>✗</a:t>
                       </a:r>
                       <a:endParaRPr lang="en-US" sz="3200">
+                        <a:solidFill>
+                          <a:schemeClr val="tx2"/>
+                        </a:solidFill>
                         <a:effectLst/>
                       </a:endParaRPr>
                     </a:p>
@@ -22538,7 +22796,7 @@
                       <a:r>
                         <a:rPr lang="en-US" sz="1400" b="0" i="0" u="none" strike="noStrike">
                           <a:solidFill>
-                            <a:srgbClr val="000000"/>
+                            <a:schemeClr val="tx2"/>
                           </a:solidFill>
                           <a:effectLst/>
                           <a:latin typeface="Century" panose="02040604050505020304" pitchFamily="18" charset="0"/>
@@ -22546,6 +22804,9 @@
                         <a:t>✓</a:t>
                       </a:r>
                       <a:endParaRPr lang="en-US" sz="3200">
+                        <a:solidFill>
+                          <a:schemeClr val="tx2"/>
+                        </a:solidFill>
                         <a:effectLst/>
                       </a:endParaRPr>
                     </a:p>
@@ -22607,7 +22868,7 @@
                       <a:r>
                         <a:rPr lang="en-US" sz="1400" b="0" i="0" u="none" strike="noStrike">
                           <a:solidFill>
-                            <a:srgbClr val="000000"/>
+                            <a:schemeClr val="tx2"/>
                           </a:solidFill>
                           <a:effectLst/>
                           <a:latin typeface="Century" panose="02040604050505020304" pitchFamily="18" charset="0"/>
@@ -22615,6 +22876,9 @@
                         <a:t>Partial</a:t>
                       </a:r>
                       <a:endParaRPr lang="en-US" sz="3200">
+                        <a:solidFill>
+                          <a:schemeClr val="tx2"/>
+                        </a:solidFill>
                         <a:effectLst/>
                       </a:endParaRPr>
                     </a:p>
@@ -22676,7 +22940,7 @@
                       <a:r>
                         <a:rPr lang="en-US" sz="1400" b="0" i="0" u="none" strike="noStrike">
                           <a:solidFill>
-                            <a:srgbClr val="000000"/>
+                            <a:schemeClr val="tx2"/>
                           </a:solidFill>
                           <a:effectLst/>
                           <a:latin typeface="Century" panose="02040604050505020304" pitchFamily="18" charset="0"/>
@@ -22684,6 +22948,9 @@
                         <a:t>✗</a:t>
                       </a:r>
                       <a:endParaRPr lang="en-US" sz="3200">
+                        <a:solidFill>
+                          <a:schemeClr val="tx2"/>
+                        </a:solidFill>
                         <a:effectLst/>
                       </a:endParaRPr>
                     </a:p>
@@ -22745,7 +23012,7 @@
                       <a:r>
                         <a:rPr lang="en-US" sz="1400" b="0" i="0" u="none" strike="noStrike">
                           <a:solidFill>
-                            <a:srgbClr val="000000"/>
+                            <a:schemeClr val="tx2"/>
                           </a:solidFill>
                           <a:effectLst/>
                           <a:latin typeface="Century" panose="02040604050505020304" pitchFamily="18" charset="0"/>
@@ -22753,6 +23020,9 @@
                         <a:t>Partial</a:t>
                       </a:r>
                       <a:endParaRPr lang="en-US" sz="3200">
+                        <a:solidFill>
+                          <a:schemeClr val="tx2"/>
+                        </a:solidFill>
                         <a:effectLst/>
                       </a:endParaRPr>
                     </a:p>
@@ -22814,7 +23084,7 @@
                       <a:r>
                         <a:rPr lang="en-US" sz="1400" b="0" i="0" u="none" strike="noStrike">
                           <a:solidFill>
-                            <a:srgbClr val="000000"/>
+                            <a:schemeClr val="tx2"/>
                           </a:solidFill>
                           <a:effectLst/>
                           <a:latin typeface="Century" panose="02040604050505020304" pitchFamily="18" charset="0"/>
@@ -22822,6 +23092,9 @@
                         <a:t>✓</a:t>
                       </a:r>
                       <a:endParaRPr lang="en-US" sz="3200">
+                        <a:solidFill>
+                          <a:schemeClr val="tx2"/>
+                        </a:solidFill>
                         <a:effectLst/>
                       </a:endParaRPr>
                     </a:p>
@@ -22890,7 +23163,7 @@
                       <a:r>
                         <a:rPr lang="en-US" sz="1400" b="0" i="0" u="none" strike="noStrike">
                           <a:solidFill>
-                            <a:srgbClr val="000000"/>
+                            <a:schemeClr val="tx2"/>
                           </a:solidFill>
                           <a:effectLst/>
                           <a:latin typeface="Century" panose="02040604050505020304" pitchFamily="18" charset="0"/>
@@ -22898,6 +23171,9 @@
                         <a:t>Multi-algorithm ensemble</a:t>
                       </a:r>
                       <a:endParaRPr lang="en-US" sz="3200">
+                        <a:solidFill>
+                          <a:schemeClr val="tx2"/>
+                        </a:solidFill>
                         <a:effectLst/>
                       </a:endParaRPr>
                     </a:p>
@@ -22959,7 +23235,7 @@
                       <a:r>
                         <a:rPr lang="en-US" sz="1400" b="0" i="0" u="none" strike="noStrike">
                           <a:solidFill>
-                            <a:srgbClr val="000000"/>
+                            <a:schemeClr val="tx2"/>
                           </a:solidFill>
                           <a:effectLst/>
                           <a:latin typeface="Century" panose="02040604050505020304" pitchFamily="18" charset="0"/>
@@ -22967,6 +23243,9 @@
                         <a:t>✗</a:t>
                       </a:r>
                       <a:endParaRPr lang="en-US" sz="3200">
+                        <a:solidFill>
+                          <a:schemeClr val="tx2"/>
+                        </a:solidFill>
                         <a:effectLst/>
                       </a:endParaRPr>
                     </a:p>
@@ -23028,7 +23307,7 @@
                       <a:r>
                         <a:rPr lang="en-US" sz="1400" b="0" i="0" u="none" strike="noStrike">
                           <a:solidFill>
-                            <a:srgbClr val="000000"/>
+                            <a:schemeClr val="tx2"/>
                           </a:solidFill>
                           <a:effectLst/>
                           <a:latin typeface="Century" panose="02040604050505020304" pitchFamily="18" charset="0"/>
@@ -23036,6 +23315,9 @@
                         <a:t>✗</a:t>
                       </a:r>
                       <a:endParaRPr lang="en-US" sz="3200">
+                        <a:solidFill>
+                          <a:schemeClr val="tx2"/>
+                        </a:solidFill>
                         <a:effectLst/>
                       </a:endParaRPr>
                     </a:p>
@@ -23097,7 +23379,7 @@
                       <a:r>
                         <a:rPr lang="en-US" sz="1400" b="0" i="0" u="none" strike="noStrike">
                           <a:solidFill>
-                            <a:srgbClr val="000000"/>
+                            <a:schemeClr val="tx2"/>
                           </a:solidFill>
                           <a:effectLst/>
                           <a:latin typeface="Century" panose="02040604050505020304" pitchFamily="18" charset="0"/>
@@ -23105,6 +23387,9 @@
                         <a:t>✗</a:t>
                       </a:r>
                       <a:endParaRPr lang="en-US" sz="3200">
+                        <a:solidFill>
+                          <a:schemeClr val="tx2"/>
+                        </a:solidFill>
                         <a:effectLst/>
                       </a:endParaRPr>
                     </a:p>
@@ -23166,7 +23451,7 @@
                       <a:r>
                         <a:rPr lang="en-US" sz="1400" b="0" i="0" u="none" strike="noStrike">
                           <a:solidFill>
-                            <a:srgbClr val="000000"/>
+                            <a:schemeClr val="tx2"/>
                           </a:solidFill>
                           <a:effectLst/>
                           <a:latin typeface="Century" panose="02040604050505020304" pitchFamily="18" charset="0"/>
@@ -23174,6 +23459,9 @@
                         <a:t>✗</a:t>
                       </a:r>
                       <a:endParaRPr lang="en-US" sz="3200">
+                        <a:solidFill>
+                          <a:schemeClr val="tx2"/>
+                        </a:solidFill>
                         <a:effectLst/>
                       </a:endParaRPr>
                     </a:p>
@@ -23235,7 +23523,7 @@
                       <a:r>
                         <a:rPr lang="en-US" sz="1400" b="0" i="0" u="none" strike="noStrike">
                           <a:solidFill>
-                            <a:srgbClr val="000000"/>
+                            <a:schemeClr val="tx2"/>
                           </a:solidFill>
                           <a:effectLst/>
                           <a:latin typeface="Century" panose="02040604050505020304" pitchFamily="18" charset="0"/>
@@ -23243,6 +23531,9 @@
                         <a:t>✗</a:t>
                       </a:r>
                       <a:endParaRPr lang="en-US" sz="3200">
+                        <a:solidFill>
+                          <a:schemeClr val="tx2"/>
+                        </a:solidFill>
                         <a:effectLst/>
                       </a:endParaRPr>
                     </a:p>
@@ -23304,7 +23595,7 @@
                       <a:r>
                         <a:rPr lang="en-US" sz="1400" b="0" i="0" u="none" strike="noStrike">
                           <a:solidFill>
-                            <a:srgbClr val="000000"/>
+                            <a:schemeClr val="tx2"/>
                           </a:solidFill>
                           <a:effectLst/>
                           <a:latin typeface="Century" panose="02040604050505020304" pitchFamily="18" charset="0"/>
@@ -23312,6 +23603,9 @@
                         <a:t>✓</a:t>
                       </a:r>
                       <a:endParaRPr lang="en-US" sz="3200">
+                        <a:solidFill>
+                          <a:schemeClr val="tx2"/>
+                        </a:solidFill>
                         <a:effectLst/>
                       </a:endParaRPr>
                     </a:p>
@@ -23380,7 +23674,7 @@
                       <a:r>
                         <a:rPr lang="en-US" sz="1400" b="0" i="0" u="none" strike="noStrike">
                           <a:solidFill>
-                            <a:srgbClr val="000000"/>
+                            <a:schemeClr val="tx2"/>
                           </a:solidFill>
                           <a:effectLst/>
                           <a:latin typeface="Century" panose="02040604050505020304" pitchFamily="18" charset="0"/>
@@ -23388,6 +23682,9 @@
                         <a:t>Confidence scores</a:t>
                       </a:r>
                       <a:endParaRPr lang="en-US" sz="3200">
+                        <a:solidFill>
+                          <a:schemeClr val="tx2"/>
+                        </a:solidFill>
                         <a:effectLst/>
                       </a:endParaRPr>
                     </a:p>
@@ -23449,7 +23746,7 @@
                       <a:r>
                         <a:rPr lang="en-US" sz="1400" b="0" i="0" u="none" strike="noStrike">
                           <a:solidFill>
-                            <a:srgbClr val="000000"/>
+                            <a:schemeClr val="tx2"/>
                           </a:solidFill>
                           <a:effectLst/>
                           <a:latin typeface="Century" panose="02040604050505020304" pitchFamily="18" charset="0"/>
@@ -23457,6 +23754,9 @@
                         <a:t>✓</a:t>
                       </a:r>
                       <a:endParaRPr lang="en-US" sz="3200">
+                        <a:solidFill>
+                          <a:schemeClr val="tx2"/>
+                        </a:solidFill>
                         <a:effectLst/>
                       </a:endParaRPr>
                     </a:p>
@@ -23518,7 +23818,7 @@
                       <a:r>
                         <a:rPr lang="en-US" sz="1400" b="0" i="0" u="none" strike="noStrike">
                           <a:solidFill>
-                            <a:srgbClr val="000000"/>
+                            <a:schemeClr val="tx2"/>
                           </a:solidFill>
                           <a:effectLst/>
                           <a:latin typeface="Century" panose="02040604050505020304" pitchFamily="18" charset="0"/>
@@ -23526,6 +23826,9 @@
                         <a:t>✓</a:t>
                       </a:r>
                       <a:endParaRPr lang="en-US" sz="3200">
+                        <a:solidFill>
+                          <a:schemeClr val="tx2"/>
+                        </a:solidFill>
                         <a:effectLst/>
                       </a:endParaRPr>
                     </a:p>
@@ -23587,7 +23890,7 @@
                       <a:r>
                         <a:rPr lang="en-US" sz="1400" b="0" i="0" u="none" strike="noStrike">
                           <a:solidFill>
-                            <a:srgbClr val="000000"/>
+                            <a:schemeClr val="tx2"/>
                           </a:solidFill>
                           <a:effectLst/>
                           <a:latin typeface="Century" panose="02040604050505020304" pitchFamily="18" charset="0"/>
@@ -23595,6 +23898,9 @@
                         <a:t>✓</a:t>
                       </a:r>
                       <a:endParaRPr lang="en-US" sz="3200">
+                        <a:solidFill>
+                          <a:schemeClr val="tx2"/>
+                        </a:solidFill>
                         <a:effectLst/>
                       </a:endParaRPr>
                     </a:p>
@@ -23656,7 +23962,7 @@
                       <a:r>
                         <a:rPr lang="en-US" sz="1400" b="0" i="0" u="none" strike="noStrike">
                           <a:solidFill>
-                            <a:srgbClr val="000000"/>
+                            <a:schemeClr val="tx2"/>
                           </a:solidFill>
                           <a:effectLst/>
                           <a:latin typeface="Century" panose="02040604050505020304" pitchFamily="18" charset="0"/>
@@ -23664,6 +23970,9 @@
                         <a:t>✗</a:t>
                       </a:r>
                       <a:endParaRPr lang="en-US" sz="3200">
+                        <a:solidFill>
+                          <a:schemeClr val="tx2"/>
+                        </a:solidFill>
                         <a:effectLst/>
                       </a:endParaRPr>
                     </a:p>
@@ -23725,7 +24034,7 @@
                       <a:r>
                         <a:rPr lang="en-US" sz="1400" b="0" i="0" u="none" strike="noStrike">
                           <a:solidFill>
-                            <a:srgbClr val="000000"/>
+                            <a:schemeClr val="tx2"/>
                           </a:solidFill>
                           <a:effectLst/>
                           <a:latin typeface="Century" panose="02040604050505020304" pitchFamily="18" charset="0"/>
@@ -23733,6 +24042,9 @@
                         <a:t>✓</a:t>
                       </a:r>
                       <a:endParaRPr lang="en-US" sz="3200">
+                        <a:solidFill>
+                          <a:schemeClr val="tx2"/>
+                        </a:solidFill>
                         <a:effectLst/>
                       </a:endParaRPr>
                     </a:p>
@@ -23794,7 +24106,7 @@
                       <a:r>
                         <a:rPr lang="en-US" sz="1400" b="0" i="0" u="none" strike="noStrike">
                           <a:solidFill>
-                            <a:srgbClr val="000000"/>
+                            <a:schemeClr val="tx2"/>
                           </a:solidFill>
                           <a:effectLst/>
                           <a:latin typeface="Century" panose="02040604050505020304" pitchFamily="18" charset="0"/>
@@ -23802,6 +24114,9 @@
                         <a:t>✓</a:t>
                       </a:r>
                       <a:endParaRPr lang="en-US" sz="3200">
+                        <a:solidFill>
+                          <a:schemeClr val="tx2"/>
+                        </a:solidFill>
                         <a:effectLst/>
                       </a:endParaRPr>
                     </a:p>
@@ -23870,7 +24185,7 @@
                       <a:r>
                         <a:rPr lang="en-US" sz="1400" b="0" i="0" u="none" strike="noStrike">
                           <a:solidFill>
-                            <a:srgbClr val="000000"/>
+                            <a:schemeClr val="tx2"/>
                           </a:solidFill>
                           <a:effectLst/>
                           <a:latin typeface="Century" panose="02040604050505020304" pitchFamily="18" charset="0"/>
@@ -23878,6 +24193,9 @@
                         <a:t>Open-ended Q&amp;A</a:t>
                       </a:r>
                       <a:endParaRPr lang="en-US" sz="3200">
+                        <a:solidFill>
+                          <a:schemeClr val="tx2"/>
+                        </a:solidFill>
                         <a:effectLst/>
                       </a:endParaRPr>
                     </a:p>
@@ -23939,7 +24257,7 @@
                       <a:r>
                         <a:rPr lang="en-US" sz="1400" b="0" i="0" u="none" strike="noStrike">
                           <a:solidFill>
-                            <a:srgbClr val="000000"/>
+                            <a:schemeClr val="tx2"/>
                           </a:solidFill>
                           <a:effectLst/>
                           <a:latin typeface="Century" panose="02040604050505020304" pitchFamily="18" charset="0"/>
@@ -23947,6 +24265,9 @@
                         <a:t>✗</a:t>
                       </a:r>
                       <a:endParaRPr lang="en-US" sz="3200">
+                        <a:solidFill>
+                          <a:schemeClr val="tx2"/>
+                        </a:solidFill>
                         <a:effectLst/>
                       </a:endParaRPr>
                     </a:p>
@@ -24008,7 +24329,7 @@
                       <a:r>
                         <a:rPr lang="en-US" sz="1400" b="0" i="0" u="none" strike="noStrike">
                           <a:solidFill>
-                            <a:srgbClr val="000000"/>
+                            <a:schemeClr val="tx2"/>
                           </a:solidFill>
                           <a:effectLst/>
                           <a:latin typeface="Century" panose="02040604050505020304" pitchFamily="18" charset="0"/>
@@ -24016,6 +24337,9 @@
                         <a:t>✓</a:t>
                       </a:r>
                       <a:endParaRPr lang="en-US" sz="3200">
+                        <a:solidFill>
+                          <a:schemeClr val="tx2"/>
+                        </a:solidFill>
                         <a:effectLst/>
                       </a:endParaRPr>
                     </a:p>
@@ -24077,7 +24401,7 @@
                       <a:r>
                         <a:rPr lang="en-US" sz="1400" b="0" i="0" u="none" strike="noStrike" dirty="0">
                           <a:solidFill>
-                            <a:srgbClr val="000000"/>
+                            <a:schemeClr val="tx2"/>
                           </a:solidFill>
                           <a:effectLst/>
                           <a:latin typeface="Century" panose="02040604050505020304" pitchFamily="18" charset="0"/>
@@ -24085,6 +24409,9 @@
                         <a:t>Partial</a:t>
                       </a:r>
                       <a:endParaRPr lang="en-US" sz="3200" dirty="0">
+                        <a:solidFill>
+                          <a:schemeClr val="tx2"/>
+                        </a:solidFill>
                         <a:effectLst/>
                       </a:endParaRPr>
                     </a:p>
@@ -24146,7 +24473,7 @@
                       <a:r>
                         <a:rPr lang="en-US" sz="1400" b="0" i="0" u="none" strike="noStrike">
                           <a:solidFill>
-                            <a:srgbClr val="000000"/>
+                            <a:schemeClr val="tx2"/>
                           </a:solidFill>
                           <a:effectLst/>
                           <a:latin typeface="Century" panose="02040604050505020304" pitchFamily="18" charset="0"/>
@@ -24154,6 +24481,9 @@
                         <a:t>✗</a:t>
                       </a:r>
                       <a:endParaRPr lang="en-US" sz="3200">
+                        <a:solidFill>
+                          <a:schemeClr val="tx2"/>
+                        </a:solidFill>
                         <a:effectLst/>
                       </a:endParaRPr>
                     </a:p>
@@ -24215,7 +24545,7 @@
                       <a:r>
                         <a:rPr lang="en-US" sz="1400" b="0" i="0" u="none" strike="noStrike">
                           <a:solidFill>
-                            <a:srgbClr val="000000"/>
+                            <a:schemeClr val="tx2"/>
                           </a:solidFill>
                           <a:effectLst/>
                           <a:latin typeface="Century" panose="02040604050505020304" pitchFamily="18" charset="0"/>
@@ -24223,6 +24553,9 @@
                         <a:t>Partial</a:t>
                       </a:r>
                       <a:endParaRPr lang="en-US" sz="3200">
+                        <a:solidFill>
+                          <a:schemeClr val="tx2"/>
+                        </a:solidFill>
                         <a:effectLst/>
                       </a:endParaRPr>
                     </a:p>
@@ -24284,7 +24617,7 @@
                       <a:r>
                         <a:rPr lang="en-US" sz="1400" b="0" i="0" u="none" strike="noStrike">
                           <a:solidFill>
-                            <a:srgbClr val="000000"/>
+                            <a:schemeClr val="tx2"/>
                           </a:solidFill>
                           <a:effectLst/>
                           <a:latin typeface="Century" panose="02040604050505020304" pitchFamily="18" charset="0"/>
@@ -24292,6 +24625,9 @@
                         <a:t>✓</a:t>
                       </a:r>
                       <a:endParaRPr lang="en-US" sz="3200">
+                        <a:solidFill>
+                          <a:schemeClr val="tx2"/>
+                        </a:solidFill>
                         <a:effectLst/>
                       </a:endParaRPr>
                     </a:p>
@@ -24360,7 +24696,7 @@
                       <a:r>
                         <a:rPr lang="en-US" sz="1400" b="0" i="0" u="none" strike="noStrike">
                           <a:solidFill>
-                            <a:srgbClr val="000000"/>
+                            <a:schemeClr val="tx2"/>
                           </a:solidFill>
                           <a:effectLst/>
                           <a:latin typeface="Century" panose="02040604050505020304" pitchFamily="18" charset="0"/>
@@ -24368,6 +24704,9 @@
                         <a:t>Authoritative knowledge base</a:t>
                       </a:r>
                       <a:endParaRPr lang="en-US" sz="3200">
+                        <a:solidFill>
+                          <a:schemeClr val="tx2"/>
+                        </a:solidFill>
                         <a:effectLst/>
                       </a:endParaRPr>
                     </a:p>
@@ -24429,7 +24768,7 @@
                       <a:r>
                         <a:rPr lang="en-US" sz="1400" b="0" i="0" u="none" strike="noStrike">
                           <a:solidFill>
-                            <a:srgbClr val="000000"/>
+                            <a:schemeClr val="tx2"/>
                           </a:solidFill>
                           <a:effectLst/>
                           <a:latin typeface="Century" panose="02040604050505020304" pitchFamily="18" charset="0"/>
@@ -24437,6 +24776,9 @@
                         <a:t>Unknown</a:t>
                       </a:r>
                       <a:endParaRPr lang="en-US" sz="3200">
+                        <a:solidFill>
+                          <a:schemeClr val="tx2"/>
+                        </a:solidFill>
                         <a:effectLst/>
                       </a:endParaRPr>
                     </a:p>
@@ -24498,7 +24840,7 @@
                       <a:r>
                         <a:rPr lang="en-US" sz="1400" b="0" i="0" u="none" strike="noStrike">
                           <a:solidFill>
-                            <a:srgbClr val="000000"/>
+                            <a:schemeClr val="tx2"/>
                           </a:solidFill>
                           <a:effectLst/>
                           <a:latin typeface="Century" panose="02040604050505020304" pitchFamily="18" charset="0"/>
@@ -24506,6 +24848,9 @@
                         <a:t>Proprietary</a:t>
                       </a:r>
                       <a:endParaRPr lang="en-US" sz="3200">
+                        <a:solidFill>
+                          <a:schemeClr val="tx2"/>
+                        </a:solidFill>
                         <a:effectLst/>
                       </a:endParaRPr>
                     </a:p>
@@ -24567,7 +24912,7 @@
                       <a:r>
                         <a:rPr lang="en-US" sz="1400" b="0" i="0" u="none" strike="noStrike" dirty="0">
                           <a:solidFill>
-                            <a:srgbClr val="000000"/>
+                            <a:schemeClr val="tx2"/>
                           </a:solidFill>
                           <a:effectLst/>
                           <a:latin typeface="Century" panose="02040604050505020304" pitchFamily="18" charset="0"/>
@@ -24575,6 +24920,9 @@
                         <a:t>Unknown</a:t>
                       </a:r>
                       <a:endParaRPr lang="en-US" sz="3200" dirty="0">
+                        <a:solidFill>
+                          <a:schemeClr val="tx2"/>
+                        </a:solidFill>
                         <a:effectLst/>
                       </a:endParaRPr>
                     </a:p>
@@ -24636,7 +24984,7 @@
                       <a:r>
                         <a:rPr lang="en-US" sz="1400" b="0" i="0" u="none" strike="noStrike">
                           <a:solidFill>
-                            <a:srgbClr val="000000"/>
+                            <a:schemeClr val="tx2"/>
                           </a:solidFill>
                           <a:effectLst/>
                           <a:latin typeface="Century" panose="02040604050505020304" pitchFamily="18" charset="0"/>
@@ -24644,6 +24992,9 @@
                         <a:t>✓</a:t>
                       </a:r>
                       <a:endParaRPr lang="en-US" sz="3200">
+                        <a:solidFill>
+                          <a:schemeClr val="tx2"/>
+                        </a:solidFill>
                         <a:effectLst/>
                       </a:endParaRPr>
                     </a:p>
@@ -24705,7 +25056,7 @@
                       <a:r>
                         <a:rPr lang="en-US" sz="1400" b="0" i="0" u="none" strike="noStrike">
                           <a:solidFill>
-                            <a:srgbClr val="000000"/>
+                            <a:schemeClr val="tx2"/>
                           </a:solidFill>
                           <a:effectLst/>
                           <a:latin typeface="Century" panose="02040604050505020304" pitchFamily="18" charset="0"/>
@@ -24713,6 +25064,9 @@
                         <a:t>Unknown</a:t>
                       </a:r>
                       <a:endParaRPr lang="en-US" sz="3200">
+                        <a:solidFill>
+                          <a:schemeClr val="tx2"/>
+                        </a:solidFill>
                         <a:effectLst/>
                       </a:endParaRPr>
                     </a:p>
@@ -24774,7 +25128,7 @@
                       <a:r>
                         <a:rPr lang="en-US" sz="1400" b="0" i="0" u="none" strike="noStrike">
                           <a:solidFill>
-                            <a:srgbClr val="000000"/>
+                            <a:schemeClr val="tx2"/>
                           </a:solidFill>
                           <a:effectLst/>
                           <a:latin typeface="Century" panose="02040604050505020304" pitchFamily="18" charset="0"/>
@@ -24782,6 +25136,9 @@
                         <a:t>✓ (Gale Encyclopedia)</a:t>
                       </a:r>
                       <a:endParaRPr lang="en-US" sz="3200">
+                        <a:solidFill>
+                          <a:schemeClr val="tx2"/>
+                        </a:solidFill>
                         <a:effectLst/>
                       </a:endParaRPr>
                     </a:p>
@@ -24850,7 +25207,7 @@
                       <a:r>
                         <a:rPr lang="en-US" sz="1400" b="0" i="0" u="none" strike="noStrike" dirty="0">
                           <a:solidFill>
-                            <a:srgbClr val="000000"/>
+                            <a:schemeClr val="tx2"/>
                           </a:solidFill>
                           <a:effectLst/>
                           <a:latin typeface="Century" panose="02040604050505020304" pitchFamily="18" charset="0"/>
@@ -24858,6 +25215,9 @@
                         <a:t>Source citation</a:t>
                       </a:r>
                       <a:endParaRPr lang="en-US" sz="3200" dirty="0">
+                        <a:solidFill>
+                          <a:schemeClr val="tx2"/>
+                        </a:solidFill>
                         <a:effectLst/>
                       </a:endParaRPr>
                     </a:p>
@@ -24919,7 +25279,7 @@
                       <a:r>
                         <a:rPr lang="en-US" sz="1400" b="0" i="0" u="none" strike="noStrike" dirty="0">
                           <a:solidFill>
-                            <a:srgbClr val="000000"/>
+                            <a:schemeClr val="tx2"/>
                           </a:solidFill>
                           <a:effectLst/>
                           <a:latin typeface="Century" panose="02040604050505020304" pitchFamily="18" charset="0"/>
@@ -24927,6 +25287,9 @@
                         <a:t>✗</a:t>
                       </a:r>
                       <a:endParaRPr lang="en-US" sz="3200" dirty="0">
+                        <a:solidFill>
+                          <a:schemeClr val="tx2"/>
+                        </a:solidFill>
                         <a:effectLst/>
                       </a:endParaRPr>
                     </a:p>
@@ -24988,7 +25351,7 @@
                       <a:r>
                         <a:rPr lang="en-US" sz="1400" b="0" i="0" u="none" strike="noStrike" dirty="0">
                           <a:solidFill>
-                            <a:srgbClr val="000000"/>
+                            <a:schemeClr val="tx2"/>
                           </a:solidFill>
                           <a:effectLst/>
                           <a:latin typeface="Century" panose="02040604050505020304" pitchFamily="18" charset="0"/>
@@ -24996,6 +25359,9 @@
                         <a:t>✗</a:t>
                       </a:r>
                       <a:endParaRPr lang="en-US" sz="3200" dirty="0">
+                        <a:solidFill>
+                          <a:schemeClr val="tx2"/>
+                        </a:solidFill>
                         <a:effectLst/>
                       </a:endParaRPr>
                     </a:p>
@@ -25057,7 +25423,7 @@
                       <a:r>
                         <a:rPr lang="en-US" sz="1400" b="0" i="0" u="none" strike="noStrike" dirty="0">
                           <a:solidFill>
-                            <a:srgbClr val="000000"/>
+                            <a:schemeClr val="tx2"/>
                           </a:solidFill>
                           <a:effectLst/>
                           <a:latin typeface="Century" panose="02040604050505020304" pitchFamily="18" charset="0"/>
@@ -25065,6 +25431,9 @@
                         <a:t>✗</a:t>
                       </a:r>
                       <a:endParaRPr lang="en-US" sz="3200" dirty="0">
+                        <a:solidFill>
+                          <a:schemeClr val="tx2"/>
+                        </a:solidFill>
                         <a:effectLst/>
                       </a:endParaRPr>
                     </a:p>
@@ -25126,7 +25495,7 @@
                       <a:r>
                         <a:rPr lang="en-US" sz="1400" b="0" i="0" u="none" strike="noStrike" dirty="0">
                           <a:solidFill>
-                            <a:srgbClr val="000000"/>
+                            <a:schemeClr val="tx2"/>
                           </a:solidFill>
                           <a:effectLst/>
                           <a:latin typeface="Century" panose="02040604050505020304" pitchFamily="18" charset="0"/>
@@ -25134,6 +25503,9 @@
                         <a:t>Partial</a:t>
                       </a:r>
                       <a:endParaRPr lang="en-US" sz="3200" dirty="0">
+                        <a:solidFill>
+                          <a:schemeClr val="tx2"/>
+                        </a:solidFill>
                         <a:effectLst/>
                       </a:endParaRPr>
                     </a:p>
@@ -25195,7 +25567,7 @@
                       <a:r>
                         <a:rPr lang="en-US" sz="1400" b="0" i="0" u="none" strike="noStrike" dirty="0">
                           <a:solidFill>
-                            <a:srgbClr val="000000"/>
+                            <a:schemeClr val="tx2"/>
                           </a:solidFill>
                           <a:effectLst/>
                           <a:latin typeface="Century" panose="02040604050505020304" pitchFamily="18" charset="0"/>
@@ -25203,6 +25575,9 @@
                         <a:t>✗</a:t>
                       </a:r>
                       <a:endParaRPr lang="en-US" sz="3200" dirty="0">
+                        <a:solidFill>
+                          <a:schemeClr val="tx2"/>
+                        </a:solidFill>
                         <a:effectLst/>
                       </a:endParaRPr>
                     </a:p>
@@ -25264,7 +25639,7 @@
                       <a:r>
                         <a:rPr lang="en-US" sz="1400" b="0" i="0" u="none" strike="noStrike" dirty="0">
                           <a:solidFill>
-                            <a:srgbClr val="000000"/>
+                            <a:schemeClr val="tx2"/>
                           </a:solidFill>
                           <a:effectLst/>
                           <a:latin typeface="Century" panose="02040604050505020304" pitchFamily="18" charset="0"/>
@@ -25272,6 +25647,9 @@
                         <a:t>✓</a:t>
                       </a:r>
                       <a:endParaRPr lang="en-US" sz="3200" dirty="0">
+                        <a:solidFill>
+                          <a:schemeClr val="tx2"/>
+                        </a:solidFill>
                         <a:effectLst/>
                       </a:endParaRPr>
                     </a:p>
@@ -25340,7 +25718,7 @@
                       <a:r>
                         <a:rPr lang="en-US" sz="1400" b="0" i="0" u="none" strike="noStrike">
                           <a:solidFill>
-                            <a:srgbClr val="000000"/>
+                            <a:schemeClr val="tx2"/>
                           </a:solidFill>
                           <a:effectLst/>
                           <a:latin typeface="Century" panose="02040604050505020304" pitchFamily="18" charset="0"/>
@@ -25348,6 +25726,9 @@
                         <a:t>Real-time performance (&lt;500ms)</a:t>
                       </a:r>
                       <a:endParaRPr lang="en-US" sz="3200">
+                        <a:solidFill>
+                          <a:schemeClr val="tx2"/>
+                        </a:solidFill>
                         <a:effectLst/>
                       </a:endParaRPr>
                     </a:p>
@@ -25409,7 +25790,7 @@
                       <a:r>
                         <a:rPr lang="en-US" sz="1400" b="0" i="0" u="none" strike="noStrike">
                           <a:solidFill>
-                            <a:srgbClr val="000000"/>
+                            <a:schemeClr val="tx2"/>
                           </a:solidFill>
                           <a:effectLst/>
                           <a:latin typeface="Century" panose="02040604050505020304" pitchFamily="18" charset="0"/>
@@ -25417,6 +25798,9 @@
                         <a:t>✓</a:t>
                       </a:r>
                       <a:endParaRPr lang="en-US" sz="3200">
+                        <a:solidFill>
+                          <a:schemeClr val="tx2"/>
+                        </a:solidFill>
                         <a:effectLst/>
                       </a:endParaRPr>
                     </a:p>
@@ -25478,7 +25862,7 @@
                       <a:r>
                         <a:rPr lang="en-US" sz="1400" b="0" i="0" u="none" strike="noStrike">
                           <a:solidFill>
-                            <a:srgbClr val="000000"/>
+                            <a:schemeClr val="tx2"/>
                           </a:solidFill>
                           <a:effectLst/>
                           <a:latin typeface="Century" panose="02040604050505020304" pitchFamily="18" charset="0"/>
@@ -25486,6 +25870,9 @@
                         <a:t>✓</a:t>
                       </a:r>
                       <a:endParaRPr lang="en-US" sz="3200">
+                        <a:solidFill>
+                          <a:schemeClr val="tx2"/>
+                        </a:solidFill>
                         <a:effectLst/>
                       </a:endParaRPr>
                     </a:p>
@@ -25547,7 +25934,7 @@
                       <a:r>
                         <a:rPr lang="en-US" sz="1400" b="0" i="0" u="none" strike="noStrike" dirty="0">
                           <a:solidFill>
-                            <a:srgbClr val="000000"/>
+                            <a:schemeClr val="tx2"/>
                           </a:solidFill>
                           <a:effectLst/>
                           <a:latin typeface="Century" panose="02040604050505020304" pitchFamily="18" charset="0"/>
@@ -25555,6 +25942,9 @@
                         <a:t>✓</a:t>
                       </a:r>
                       <a:endParaRPr lang="en-US" sz="3200" dirty="0">
+                        <a:solidFill>
+                          <a:schemeClr val="tx2"/>
+                        </a:solidFill>
                         <a:effectLst/>
                       </a:endParaRPr>
                     </a:p>
@@ -25616,7 +26006,7 @@
                       <a:r>
                         <a:rPr lang="en-US" sz="1400" b="0" i="0" u="none" strike="noStrike">
                           <a:solidFill>
-                            <a:srgbClr val="000000"/>
+                            <a:schemeClr val="tx2"/>
                           </a:solidFill>
                           <a:effectLst/>
                           <a:latin typeface="Century" panose="02040604050505020304" pitchFamily="18" charset="0"/>
@@ -25624,6 +26014,9 @@
                         <a:t>✓</a:t>
                       </a:r>
                       <a:endParaRPr lang="en-US" sz="3200">
+                        <a:solidFill>
+                          <a:schemeClr val="tx2"/>
+                        </a:solidFill>
                         <a:effectLst/>
                       </a:endParaRPr>
                     </a:p>
@@ -25685,7 +26078,7 @@
                       <a:r>
                         <a:rPr lang="en-US" sz="1400" b="0" i="0" u="none" strike="noStrike">
                           <a:solidFill>
-                            <a:srgbClr val="000000"/>
+                            <a:schemeClr val="tx2"/>
                           </a:solidFill>
                           <a:effectLst/>
                           <a:latin typeface="Century" panose="02040604050505020304" pitchFamily="18" charset="0"/>
@@ -25693,6 +26086,9 @@
                         <a:t>✓</a:t>
                       </a:r>
                       <a:endParaRPr lang="en-US" sz="3200">
+                        <a:solidFill>
+                          <a:schemeClr val="tx2"/>
+                        </a:solidFill>
                         <a:effectLst/>
                       </a:endParaRPr>
                     </a:p>
@@ -25754,7 +26150,7 @@
                       <a:r>
                         <a:rPr lang="en-US" sz="1400" b="0" i="0" u="none" strike="noStrike" dirty="0">
                           <a:solidFill>
-                            <a:srgbClr val="000000"/>
+                            <a:schemeClr val="tx2"/>
                           </a:solidFill>
                           <a:effectLst/>
                           <a:latin typeface="Century" panose="02040604050505020304" pitchFamily="18" charset="0"/>
@@ -25762,6 +26158,9 @@
                         <a:t>✓</a:t>
                       </a:r>
                       <a:endParaRPr lang="en-US" sz="3200" dirty="0">
+                        <a:solidFill>
+                          <a:schemeClr val="tx2"/>
+                        </a:solidFill>
                         <a:effectLst/>
                       </a:endParaRPr>
                     </a:p>
@@ -25830,7 +26229,7 @@
                       <a:r>
                         <a:rPr lang="en-US" sz="1400" b="0" i="0" u="none" strike="noStrike">
                           <a:solidFill>
-                            <a:srgbClr val="000000"/>
+                            <a:schemeClr val="tx2"/>
                           </a:solidFill>
                           <a:effectLst/>
                           <a:latin typeface="Century" panose="02040604050505020304" pitchFamily="18" charset="0"/>
@@ -25838,6 +26237,9 @@
                         <a:t>Physician validation</a:t>
                       </a:r>
                       <a:endParaRPr lang="en-US" sz="3200">
+                        <a:solidFill>
+                          <a:schemeClr val="tx2"/>
+                        </a:solidFill>
                         <a:effectLst/>
                       </a:endParaRPr>
                     </a:p>
@@ -25899,7 +26301,7 @@
                       <a:r>
                         <a:rPr lang="en-US" sz="1400" b="0" i="0" u="none" strike="noStrike">
                           <a:solidFill>
-                            <a:srgbClr val="000000"/>
+                            <a:schemeClr val="tx2"/>
                           </a:solidFill>
                           <a:effectLst/>
                           <a:latin typeface="Century" panose="02040604050505020304" pitchFamily="18" charset="0"/>
@@ -25907,6 +26309,9 @@
                         <a:t>✓</a:t>
                       </a:r>
                       <a:endParaRPr lang="en-US" sz="3200">
+                        <a:solidFill>
+                          <a:schemeClr val="tx2"/>
+                        </a:solidFill>
                         <a:effectLst/>
                       </a:endParaRPr>
                     </a:p>
@@ -25968,7 +26373,7 @@
                       <a:r>
                         <a:rPr lang="en-US" sz="1400" b="0" i="0" u="none" strike="noStrike">
                           <a:solidFill>
-                            <a:srgbClr val="000000"/>
+                            <a:schemeClr val="tx2"/>
                           </a:solidFill>
                           <a:effectLst/>
                           <a:latin typeface="Century" panose="02040604050505020304" pitchFamily="18" charset="0"/>
@@ -25976,6 +26381,9 @@
                         <a:t>✓</a:t>
                       </a:r>
                       <a:endParaRPr lang="en-US" sz="3200">
+                        <a:solidFill>
+                          <a:schemeClr val="tx2"/>
+                        </a:solidFill>
                         <a:effectLst/>
                       </a:endParaRPr>
                     </a:p>
@@ -26037,7 +26445,7 @@
                       <a:r>
                         <a:rPr lang="en-US" sz="1400" b="0" i="0" u="none" strike="noStrike">
                           <a:solidFill>
-                            <a:srgbClr val="000000"/>
+                            <a:schemeClr val="tx2"/>
                           </a:solidFill>
                           <a:effectLst/>
                           <a:latin typeface="Century" panose="02040604050505020304" pitchFamily="18" charset="0"/>
@@ -26045,6 +26453,9 @@
                         <a:t>✓</a:t>
                       </a:r>
                       <a:endParaRPr lang="en-US" sz="3200">
+                        <a:solidFill>
+                          <a:schemeClr val="tx2"/>
+                        </a:solidFill>
                         <a:effectLst/>
                       </a:endParaRPr>
                     </a:p>
@@ -26106,7 +26517,7 @@
                       <a:r>
                         <a:rPr lang="en-US" sz="1400" b="0" i="0" u="none" strike="noStrike">
                           <a:solidFill>
-                            <a:srgbClr val="000000"/>
+                            <a:schemeClr val="tx2"/>
                           </a:solidFill>
                           <a:effectLst/>
                           <a:latin typeface="Century" panose="02040604050505020304" pitchFamily="18" charset="0"/>
@@ -26114,6 +26525,9 @@
                         <a:t>✗</a:t>
                       </a:r>
                       <a:endParaRPr lang="en-US" sz="3200">
+                        <a:solidFill>
+                          <a:schemeClr val="tx2"/>
+                        </a:solidFill>
                         <a:effectLst/>
                       </a:endParaRPr>
                     </a:p>
@@ -26175,7 +26589,7 @@
                       <a:r>
                         <a:rPr lang="en-US" sz="1400" b="0" i="0" u="none" strike="noStrike">
                           <a:solidFill>
-                            <a:srgbClr val="000000"/>
+                            <a:schemeClr val="tx2"/>
                           </a:solidFill>
                           <a:effectLst/>
                           <a:latin typeface="Century" panose="02040604050505020304" pitchFamily="18" charset="0"/>
@@ -26183,6 +26597,9 @@
                         <a:t>✓</a:t>
                       </a:r>
                       <a:endParaRPr lang="en-US" sz="3200">
+                        <a:solidFill>
+                          <a:schemeClr val="tx2"/>
+                        </a:solidFill>
                         <a:effectLst/>
                       </a:endParaRPr>
                     </a:p>
@@ -26244,7 +26661,7 @@
                       <a:r>
                         <a:rPr lang="en-US" sz="1400" b="0" i="0" u="none" strike="noStrike">
                           <a:solidFill>
-                            <a:srgbClr val="000000"/>
+                            <a:schemeClr val="tx2"/>
                           </a:solidFill>
                           <a:effectLst/>
                           <a:latin typeface="Century" panose="02040604050505020304" pitchFamily="18" charset="0"/>
@@ -26252,6 +26669,9 @@
                         <a:t>✓</a:t>
                       </a:r>
                       <a:endParaRPr lang="en-US" sz="3200">
+                        <a:solidFill>
+                          <a:schemeClr val="tx2"/>
+                        </a:solidFill>
                         <a:effectLst/>
                       </a:endParaRPr>
                     </a:p>
@@ -26320,7 +26740,7 @@
                       <a:r>
                         <a:rPr lang="en-US" sz="1400" b="0" i="0" u="none" strike="noStrike">
                           <a:solidFill>
-                            <a:srgbClr val="000000"/>
+                            <a:schemeClr val="tx2"/>
                           </a:solidFill>
                           <a:effectLst/>
                           <a:latin typeface="Century" panose="02040604050505020304" pitchFamily="18" charset="0"/>
@@ -26328,6 +26748,9 @@
                         <a:t>Dual-mode consultation (ML + RAG)</a:t>
                       </a:r>
                       <a:endParaRPr lang="en-US" sz="3200">
+                        <a:solidFill>
+                          <a:schemeClr val="tx2"/>
+                        </a:solidFill>
                         <a:effectLst/>
                       </a:endParaRPr>
                     </a:p>
@@ -26389,7 +26812,7 @@
                       <a:r>
                         <a:rPr lang="en-US" sz="1400" b="0" i="0" u="none" strike="noStrike">
                           <a:solidFill>
-                            <a:srgbClr val="000000"/>
+                            <a:schemeClr val="tx2"/>
                           </a:solidFill>
                           <a:effectLst/>
                           <a:latin typeface="Century" panose="02040604050505020304" pitchFamily="18" charset="0"/>
@@ -26397,6 +26820,9 @@
                         <a:t>✗</a:t>
                       </a:r>
                       <a:endParaRPr lang="en-US" sz="3200">
+                        <a:solidFill>
+                          <a:schemeClr val="tx2"/>
+                        </a:solidFill>
                         <a:effectLst/>
                       </a:endParaRPr>
                     </a:p>
@@ -26458,7 +26884,7 @@
                       <a:r>
                         <a:rPr lang="en-US" sz="1400" b="0" i="0" u="none" strike="noStrike">
                           <a:solidFill>
-                            <a:srgbClr val="000000"/>
+                            <a:schemeClr val="tx2"/>
                           </a:solidFill>
                           <a:effectLst/>
                           <a:latin typeface="Century" panose="02040604050505020304" pitchFamily="18" charset="0"/>
@@ -26466,6 +26892,9 @@
                         <a:t>✗</a:t>
                       </a:r>
                       <a:endParaRPr lang="en-US" sz="3200">
+                        <a:solidFill>
+                          <a:schemeClr val="tx2"/>
+                        </a:solidFill>
                         <a:effectLst/>
                       </a:endParaRPr>
                     </a:p>
@@ -26527,7 +26956,7 @@
                       <a:r>
                         <a:rPr lang="en-US" sz="1400" b="0" i="0" u="none" strike="noStrike">
                           <a:solidFill>
-                            <a:srgbClr val="000000"/>
+                            <a:schemeClr val="tx2"/>
                           </a:solidFill>
                           <a:effectLst/>
                           <a:latin typeface="Century" panose="02040604050505020304" pitchFamily="18" charset="0"/>
@@ -26535,6 +26964,9 @@
                         <a:t>✗</a:t>
                       </a:r>
                       <a:endParaRPr lang="en-US" sz="3200">
+                        <a:solidFill>
+                          <a:schemeClr val="tx2"/>
+                        </a:solidFill>
                         <a:effectLst/>
                       </a:endParaRPr>
                     </a:p>
@@ -26596,7 +27028,7 @@
                       <a:r>
                         <a:rPr lang="en-US" sz="1400" b="0" i="0" u="none" strike="noStrike" dirty="0">
                           <a:solidFill>
-                            <a:srgbClr val="000000"/>
+                            <a:schemeClr val="tx2"/>
                           </a:solidFill>
                           <a:effectLst/>
                           <a:latin typeface="Century" panose="02040604050505020304" pitchFamily="18" charset="0"/>
@@ -26604,6 +27036,9 @@
                         <a:t>✗</a:t>
                       </a:r>
                       <a:endParaRPr lang="en-US" sz="3200" dirty="0">
+                        <a:solidFill>
+                          <a:schemeClr val="tx2"/>
+                        </a:solidFill>
                         <a:effectLst/>
                       </a:endParaRPr>
                     </a:p>
@@ -26665,7 +27100,7 @@
                       <a:r>
                         <a:rPr lang="en-US" sz="1400" b="0" i="0" u="none" strike="noStrike">
                           <a:solidFill>
-                            <a:srgbClr val="000000"/>
+                            <a:schemeClr val="tx2"/>
                           </a:solidFill>
                           <a:effectLst/>
                           <a:latin typeface="Century" panose="02040604050505020304" pitchFamily="18" charset="0"/>
@@ -26673,6 +27108,9 @@
                         <a:t>✗</a:t>
                       </a:r>
                       <a:endParaRPr lang="en-US" sz="3200">
+                        <a:solidFill>
+                          <a:schemeClr val="tx2"/>
+                        </a:solidFill>
                         <a:effectLst/>
                       </a:endParaRPr>
                     </a:p>
@@ -26734,7 +27172,7 @@
                       <a:r>
                         <a:rPr lang="en-US" sz="1400" b="0" i="0" u="none" strike="noStrike">
                           <a:solidFill>
-                            <a:srgbClr val="000000"/>
+                            <a:schemeClr val="tx2"/>
                           </a:solidFill>
                           <a:effectLst/>
                           <a:latin typeface="Century" panose="02040604050505020304" pitchFamily="18" charset="0"/>
@@ -26742,6 +27180,9 @@
                         <a:t>✓</a:t>
                       </a:r>
                       <a:endParaRPr lang="en-US" sz="3200">
+                        <a:solidFill>
+                          <a:schemeClr val="tx2"/>
+                        </a:solidFill>
                         <a:effectLst/>
                       </a:endParaRPr>
                     </a:p>
@@ -26810,7 +27251,7 @@
                       <a:r>
                         <a:rPr lang="en-US" sz="1400" b="0" i="0" u="none" strike="noStrike">
                           <a:solidFill>
-                            <a:srgbClr val="000000"/>
+                            <a:schemeClr val="tx2"/>
                           </a:solidFill>
                           <a:effectLst/>
                           <a:latin typeface="Century" panose="02040604050505020304" pitchFamily="18" charset="0"/>
@@ -26818,6 +27259,9 @@
                         <a:t>Interpretable decisions</a:t>
                       </a:r>
                       <a:endParaRPr lang="en-US" sz="3200">
+                        <a:solidFill>
+                          <a:schemeClr val="tx2"/>
+                        </a:solidFill>
                         <a:effectLst/>
                       </a:endParaRPr>
                     </a:p>
@@ -26879,7 +27323,7 @@
                       <a:r>
                         <a:rPr lang="en-US" sz="1400" b="0" i="0" u="none" strike="noStrike">
                           <a:solidFill>
-                            <a:srgbClr val="000000"/>
+                            <a:schemeClr val="tx2"/>
                           </a:solidFill>
                           <a:effectLst/>
                           <a:latin typeface="Century" panose="02040604050505020304" pitchFamily="18" charset="0"/>
@@ -26887,6 +27331,9 @@
                         <a:t>Partial</a:t>
                       </a:r>
                       <a:endParaRPr lang="en-US" sz="3200">
+                        <a:solidFill>
+                          <a:schemeClr val="tx2"/>
+                        </a:solidFill>
                         <a:effectLst/>
                       </a:endParaRPr>
                     </a:p>
@@ -26948,7 +27395,7 @@
                       <a:r>
                         <a:rPr lang="en-US" sz="1400" b="0" i="0" u="none" strike="noStrike">
                           <a:solidFill>
-                            <a:srgbClr val="000000"/>
+                            <a:schemeClr val="tx2"/>
                           </a:solidFill>
                           <a:effectLst/>
                           <a:latin typeface="Century" panose="02040604050505020304" pitchFamily="18" charset="0"/>
@@ -26956,6 +27403,9 @@
                         <a:t>✗</a:t>
                       </a:r>
                       <a:endParaRPr lang="en-US" sz="3200">
+                        <a:solidFill>
+                          <a:schemeClr val="tx2"/>
+                        </a:solidFill>
                         <a:effectLst/>
                       </a:endParaRPr>
                     </a:p>
@@ -27017,7 +27467,7 @@
                       <a:r>
                         <a:rPr lang="en-US" sz="1400" b="0" i="0" u="none" strike="noStrike">
                           <a:solidFill>
-                            <a:srgbClr val="000000"/>
+                            <a:schemeClr val="tx2"/>
                           </a:solidFill>
                           <a:effectLst/>
                           <a:latin typeface="Century" panose="02040604050505020304" pitchFamily="18" charset="0"/>
@@ -27025,6 +27475,9 @@
                         <a:t>Partial</a:t>
                       </a:r>
                       <a:endParaRPr lang="en-US" sz="3200">
+                        <a:solidFill>
+                          <a:schemeClr val="tx2"/>
+                        </a:solidFill>
                         <a:effectLst/>
                       </a:endParaRPr>
                     </a:p>
@@ -27086,7 +27539,7 @@
                       <a:r>
                         <a:rPr lang="en-US" sz="1400" b="0" i="0" u="none" strike="noStrike">
                           <a:solidFill>
-                            <a:srgbClr val="000000"/>
+                            <a:schemeClr val="tx2"/>
                           </a:solidFill>
                           <a:effectLst/>
                           <a:latin typeface="Century" panose="02040604050505020304" pitchFamily="18" charset="0"/>
@@ -27094,6 +27547,9 @@
                         <a:t>✗</a:t>
                       </a:r>
                       <a:endParaRPr lang="en-US" sz="3200">
+                        <a:solidFill>
+                          <a:schemeClr val="tx2"/>
+                        </a:solidFill>
                         <a:effectLst/>
                       </a:endParaRPr>
                     </a:p>
@@ -27155,7 +27611,7 @@
                       <a:r>
                         <a:rPr lang="en-US" sz="1400" b="0" i="0" u="none" strike="noStrike">
                           <a:solidFill>
-                            <a:srgbClr val="000000"/>
+                            <a:schemeClr val="tx2"/>
                           </a:solidFill>
                           <a:effectLst/>
                           <a:latin typeface="Century" panose="02040604050505020304" pitchFamily="18" charset="0"/>
@@ -27163,6 +27619,9 @@
                         <a:t>Partial</a:t>
                       </a:r>
                       <a:endParaRPr lang="en-US" sz="3200">
+                        <a:solidFill>
+                          <a:schemeClr val="tx2"/>
+                        </a:solidFill>
                         <a:effectLst/>
                       </a:endParaRPr>
                     </a:p>
@@ -27224,7 +27683,7 @@
                       <a:r>
                         <a:rPr lang="en-US" sz="1400" b="0" i="0" u="none" strike="noStrike" dirty="0">
                           <a:solidFill>
-                            <a:srgbClr val="000000"/>
+                            <a:schemeClr val="tx2"/>
                           </a:solidFill>
                           <a:effectLst/>
                           <a:latin typeface="Century" panose="02040604050505020304" pitchFamily="18" charset="0"/>
@@ -27232,6 +27691,9 @@
                         <a:t>✓</a:t>
                       </a:r>
                       <a:endParaRPr lang="en-US" sz="3200" dirty="0">
+                        <a:solidFill>
+                          <a:schemeClr val="tx2"/>
+                        </a:solidFill>
                         <a:effectLst/>
                       </a:endParaRPr>
                     </a:p>

</xml_diff>